<commit_message>
add a bit more to lesson 2
</commit_message>
<xml_diff>
--- a/Lessons/B_IntroToDM_BasicEDA/B_Practice.pptx
+++ b/Lessons/B_IntroToDM_BasicEDA/B_Practice.pptx
@@ -209,7 +209,7 @@
           <a:p>
             <a:fld id="{C333ABA6-B72D-4ED4-A6E7-13A0DAE65F1A}" type="datetimeFigureOut">
               <a:rPr lang="en-US" smtClean="0"/>
-              <a:t>9/5/22</a:t>
+              <a:t>9/18/23</a:t>
             </a:fld>
             <a:endParaRPr lang="en-US"/>
           </a:p>
@@ -692,7 +692,7 @@
           <a:p>
             <a:fld id="{5738B90E-0779-4C36-915C-6F05FCD89456}" type="datetime1">
               <a:rPr lang="en-US" smtClean="0"/>
-              <a:t>9/5/22</a:t>
+              <a:t>9/18/23</a:t>
             </a:fld>
             <a:endParaRPr lang="en-US"/>
           </a:p>
@@ -802,7 +802,7 @@
           <a:p>
             <a:r>
               <a:rPr lang="en-US" dirty="0"/>
-              <a:t>Kwartler CSCI S-96</a:t>
+              <a:t>Kwartler </a:t>
             </a:r>
           </a:p>
         </p:txBody>
@@ -910,7 +910,7 @@
           <a:p>
             <a:fld id="{7B9EA29D-D431-42FE-B7B6-AAE4454C77D3}" type="datetime1">
               <a:rPr lang="en-US" smtClean="0"/>
-              <a:t>9/5/22</a:t>
+              <a:t>9/18/23</a:t>
             </a:fld>
             <a:endParaRPr lang="en-US"/>
           </a:p>
@@ -932,8 +932,8 @@
           <a:lstStyle/>
           <a:p>
             <a:r>
-              <a:rPr lang="en-US"/>
-              <a:t>Kwartler CSCI S-96</a:t>
+              <a:rPr lang="en-US" dirty="0"/>
+              <a:t>Kwartler </a:t>
             </a:r>
           </a:p>
         </p:txBody>
@@ -1170,7 +1170,7 @@
           <a:p>
             <a:fld id="{690D8A1E-EA8F-46C1-B891-AE0C00D9C314}" type="datetime1">
               <a:rPr lang="en-US" smtClean="0"/>
-              <a:t>9/5/22</a:t>
+              <a:t>9/18/23</a:t>
             </a:fld>
             <a:endParaRPr lang="en-US"/>
           </a:p>
@@ -1326,7 +1326,7 @@
           <a:p>
             <a:r>
               <a:rPr lang="en-US" dirty="0"/>
-              <a:t>Kwartler CSCI S-96</a:t>
+              <a:t>Kwartler </a:t>
             </a:r>
           </a:p>
         </p:txBody>
@@ -1464,7 +1464,7 @@
           <a:p>
             <a:fld id="{D753EFC8-4232-4598-94F6-94C0EBAFC469}" type="datetime1">
               <a:rPr lang="en-US" smtClean="0"/>
-              <a:t>9/5/22</a:t>
+              <a:t>9/18/23</a:t>
             </a:fld>
             <a:endParaRPr lang="en-US"/>
           </a:p>
@@ -1574,7 +1574,7 @@
           <a:p>
             <a:r>
               <a:rPr lang="en-US" dirty="0"/>
-              <a:t>Kwartler CSCI S-96</a:t>
+              <a:t>Kwartler </a:t>
             </a:r>
           </a:p>
         </p:txBody>
@@ -1779,7 +1779,7 @@
           <a:p>
             <a:fld id="{F3161074-1C18-4AE7-957D-F18524378C85}" type="datetime1">
               <a:rPr lang="en-US" smtClean="0"/>
-              <a:t>9/5/22</a:t>
+              <a:t>9/18/23</a:t>
             </a:fld>
             <a:endParaRPr lang="en-US"/>
           </a:p>
@@ -1889,7 +1889,7 @@
           <a:p>
             <a:r>
               <a:rPr lang="en-US" dirty="0"/>
-              <a:t>Kwartler CSCI S-96</a:t>
+              <a:t>Kwartler </a:t>
             </a:r>
           </a:p>
         </p:txBody>
@@ -2053,7 +2053,7 @@
           <a:p>
             <a:fld id="{69BE256C-8D9A-4404-B47D-41A1AE514425}" type="datetime1">
               <a:rPr lang="en-US" smtClean="0"/>
-              <a:t>9/5/22</a:t>
+              <a:t>9/18/23</a:t>
             </a:fld>
             <a:endParaRPr lang="en-US"/>
           </a:p>
@@ -2193,7 +2193,7 @@
           <a:p>
             <a:r>
               <a:rPr lang="en-US" dirty="0"/>
-              <a:t>Kwartler CSCI S-96</a:t>
+              <a:t>Kwartler </a:t>
             </a:r>
           </a:p>
         </p:txBody>
@@ -2487,7 +2487,7 @@
           <a:p>
             <a:fld id="{66CB2154-9035-4012-8189-BAAB61C5A5EE}" type="datetime1">
               <a:rPr lang="en-US" smtClean="0"/>
-              <a:t>9/5/22</a:t>
+              <a:t>9/18/23</a:t>
             </a:fld>
             <a:endParaRPr lang="en-US"/>
           </a:p>
@@ -2509,8 +2509,8 @@
           <a:lstStyle/>
           <a:p>
             <a:r>
-              <a:rPr lang="en-US"/>
-              <a:t>Kwartler CSCI S-96</a:t>
+              <a:rPr lang="en-US" dirty="0"/>
+              <a:t>Kwartler </a:t>
             </a:r>
           </a:p>
         </p:txBody>
@@ -2661,7 +2661,7 @@
           <a:p>
             <a:fld id="{6700A58B-DD98-43D0-B791-721480A02982}" type="datetime1">
               <a:rPr lang="en-US" smtClean="0"/>
-              <a:t>9/5/22</a:t>
+              <a:t>9/18/23</a:t>
             </a:fld>
             <a:endParaRPr lang="en-US"/>
           </a:p>
@@ -2801,7 +2801,7 @@
           <a:p>
             <a:r>
               <a:rPr lang="en-US" dirty="0"/>
-              <a:t>Kwartler CSCI S-96</a:t>
+              <a:t>Kwartler </a:t>
             </a:r>
           </a:p>
         </p:txBody>
@@ -2853,7 +2853,7 @@
           <a:p>
             <a:fld id="{7DB6E382-4F61-4E24-BE1A-377EC83D0E3A}" type="datetime1">
               <a:rPr lang="en-US" smtClean="0"/>
-              <a:t>9/5/22</a:t>
+              <a:t>9/18/23</a:t>
             </a:fld>
             <a:endParaRPr lang="en-US"/>
           </a:p>
@@ -2963,7 +2963,7 @@
           <a:p>
             <a:r>
               <a:rPr lang="en-US" dirty="0"/>
-              <a:t>Kwartler CSCI S-96</a:t>
+              <a:t>Kwartler </a:t>
             </a:r>
           </a:p>
         </p:txBody>
@@ -3164,7 +3164,7 @@
           <a:p>
             <a:fld id="{4142EED6-FC16-45B9-B8C4-2BC5DBA88325}" type="datetime1">
               <a:rPr lang="en-US" smtClean="0"/>
-              <a:t>9/5/22</a:t>
+              <a:t>9/18/23</a:t>
             </a:fld>
             <a:endParaRPr lang="en-US"/>
           </a:p>
@@ -3304,7 +3304,7 @@
           <a:p>
             <a:r>
               <a:rPr lang="en-US" dirty="0"/>
-              <a:t>Kwartler CSCI S-96</a:t>
+              <a:t>Kwartler </a:t>
             </a:r>
           </a:p>
         </p:txBody>
@@ -3482,7 +3482,7 @@
           <a:p>
             <a:fld id="{DF59512B-4F1D-43D7-8819-2F53FEF69650}" type="datetime1">
               <a:rPr lang="en-US" smtClean="0"/>
-              <a:t>9/5/22</a:t>
+              <a:t>9/18/23</a:t>
             </a:fld>
             <a:endParaRPr lang="en-US"/>
           </a:p>
@@ -3622,7 +3622,7 @@
           <a:p>
             <a:r>
               <a:rPr lang="en-US" dirty="0"/>
-              <a:t>Kwartler CSCI S-96</a:t>
+              <a:t>Kwartler </a:t>
             </a:r>
           </a:p>
         </p:txBody>
@@ -3758,7 +3758,7 @@
           <a:p>
             <a:fld id="{08437B94-E2BF-44DC-ADC5-B05FC9934E9D}" type="datetime1">
               <a:rPr lang="en-US" smtClean="0"/>
-              <a:t>9/5/22</a:t>
+              <a:t>9/18/23</a:t>
             </a:fld>
             <a:endParaRPr lang="en-US"/>
           </a:p>
@@ -3799,7 +3799,7 @@
           <a:p>
             <a:r>
               <a:rPr lang="en-US" dirty="0"/>
-              <a:t>Kwartler CSCI S-96</a:t>
+              <a:t>Kwartler </a:t>
             </a:r>
           </a:p>
         </p:txBody>
@@ -4684,7 +4684,7 @@
           <a:p>
             <a:fld id="{9B19E99B-5349-415A-8E56-8E989211A366}" type="datetime1">
               <a:rPr lang="en-US" smtClean="0"/>
-              <a:t>9/5/22</a:t>
+              <a:t>9/18/23</a:t>
             </a:fld>
             <a:endParaRPr lang="en-US"/>
           </a:p>
@@ -4741,7 +4741,7 @@
           <a:p>
             <a:r>
               <a:rPr lang="en-US" dirty="0"/>
-              <a:t>Kwartler CSCI E-96</a:t>
+              <a:t>Kwartler </a:t>
             </a:r>
           </a:p>
         </p:txBody>
@@ -4823,7 +4823,7 @@
           <a:p>
             <a:fld id="{6700A58B-DD98-43D0-B791-721480A02982}" type="datetime1">
               <a:rPr lang="en-US" smtClean="0"/>
-              <a:t>9/5/22</a:t>
+              <a:t>9/18/23</a:t>
             </a:fld>
             <a:endParaRPr lang="en-US"/>
           </a:p>
@@ -5034,7 +5034,7 @@
           <a:p>
             <a:r>
               <a:rPr lang="en-US" dirty="0"/>
-              <a:t>Kwartler CSCI E-96</a:t>
+              <a:t>Kwartler </a:t>
             </a:r>
           </a:p>
         </p:txBody>
@@ -5086,7 +5086,7 @@
           <a:p>
             <a:fld id="{6700A58B-DD98-43D0-B791-721480A02982}" type="datetime1">
               <a:rPr lang="en-US" smtClean="0"/>
-              <a:t>9/5/22</a:t>
+              <a:t>9/18/23</a:t>
             </a:fld>
             <a:endParaRPr lang="en-US"/>
           </a:p>
@@ -5329,7 +5329,7 @@
           <a:p>
             <a:r>
               <a:rPr lang="en-US" dirty="0"/>
-              <a:t>Kwartler CSCI E-96</a:t>
+              <a:t>Kwartler </a:t>
             </a:r>
           </a:p>
         </p:txBody>
@@ -5515,7 +5515,7 @@
           <a:p>
             <a:fld id="{D753EFC8-4232-4598-94F6-94C0EBAFC469}" type="datetime1">
               <a:rPr lang="en-US" smtClean="0"/>
-              <a:t>9/5/22</a:t>
+              <a:t>9/18/23</a:t>
             </a:fld>
             <a:endParaRPr lang="en-US"/>
           </a:p>
@@ -5983,7 +5983,7 @@
           <a:p>
             <a:r>
               <a:rPr lang="en-US" dirty="0"/>
-              <a:t>Kwartler CSCI E-96</a:t>
+              <a:t>Kwartler </a:t>
             </a:r>
           </a:p>
         </p:txBody>
@@ -6035,7 +6035,7 @@
           <a:p>
             <a:fld id="{6700A58B-DD98-43D0-B791-721480A02982}" type="datetime1">
               <a:rPr lang="en-US" smtClean="0"/>
-              <a:t>9/5/22</a:t>
+              <a:t>9/18/23</a:t>
             </a:fld>
             <a:endParaRPr lang="en-US"/>
           </a:p>
@@ -6095,7 +6095,7 @@
         <p:spPr>
           <a:xfrm>
             <a:off x="421856" y="994291"/>
-            <a:ext cx="8505573" cy="2954655"/>
+            <a:ext cx="8505573" cy="3693319"/>
           </a:xfrm>
           <a:prstGeom prst="rect">
             <a:avLst/>
@@ -6107,19 +6107,6 @@
             <a:spAutoFit/>
           </a:bodyPr>
           <a:lstStyle/>
-          <a:p>
-            <a:endParaRPr lang="en-US" sz="2400" dirty="0"/>
-          </a:p>
-          <a:p>
-            <a:pPr marL="285750" indent="-285750">
-              <a:buFont typeface="Arial" panose="020B0604020202020204" pitchFamily="34" charset="0"/>
-              <a:buChar char="•"/>
-            </a:pPr>
-            <a:r>
-              <a:rPr lang="en-US" sz="2400" dirty="0"/>
-              <a:t>Homework suggestions…check the syllabus</a:t>
-            </a:r>
-          </a:p>
           <a:p>
             <a:pPr marL="285750" indent="-285750">
               <a:buFont typeface="Arial" panose="020B0604020202020204" pitchFamily="34" charset="0"/>
@@ -6180,8 +6167,32 @@
             </a:pPr>
             <a:r>
               <a:rPr lang="en-US" sz="2400" dirty="0"/>
-              <a:t>Ask questions publicly on the class forum</a:t>
-            </a:r>
+              <a:t>Ask questions publicly on the class forum or use </a:t>
+            </a:r>
+            <a:r>
+              <a:rPr lang="en-US" sz="2400" dirty="0">
+                <a:hlinkClick r:id="rId2"/>
+              </a:rPr>
+              <a:t>www.llmaid.com</a:t>
+            </a:r>
+            <a:endParaRPr lang="en-US" sz="2400" dirty="0"/>
+          </a:p>
+          <a:p>
+            <a:pPr marL="285750" indent="-285750">
+              <a:buFont typeface="Arial" panose="020B0604020202020204" pitchFamily="34" charset="0"/>
+              <a:buChar char="•"/>
+            </a:pPr>
+            <a:endParaRPr lang="en-US" sz="2400" dirty="0"/>
+          </a:p>
+          <a:p>
+            <a:endParaRPr lang="en-US" sz="2400" dirty="0"/>
+          </a:p>
+          <a:p>
+            <a:pPr marL="285750" indent="-285750">
+              <a:buFont typeface="Arial" panose="020B0604020202020204" pitchFamily="34" charset="0"/>
+              <a:buChar char="•"/>
+            </a:pPr>
+            <a:endParaRPr lang="en-US" sz="2400" dirty="0"/>
           </a:p>
         </p:txBody>
       </p:sp>
@@ -6213,7 +6224,7 @@
           <a:p>
             <a:r>
               <a:rPr lang="en-US" dirty="0"/>
-              <a:t>Kwartler CSCI E-96</a:t>
+              <a:t>Kwartler </a:t>
             </a:r>
           </a:p>
         </p:txBody>
@@ -6271,7 +6282,7 @@
           <a:p>
             <a:fld id="{6700A58B-DD98-43D0-B791-721480A02982}" type="datetime1">
               <a:rPr lang="en-US" smtClean="0"/>
-              <a:t>9/5/22</a:t>
+              <a:t>9/18/23</a:t>
             </a:fld>
             <a:endParaRPr lang="en-US"/>
           </a:p>
@@ -6356,10 +6367,9 @@
           <a:lstStyle/>
           <a:p>
             <a:r>
-              <a:rPr lang="en-US"/>
-              <a:t>Kwartler CSCI S-96</a:t>
-            </a:r>
-            <a:endParaRPr lang="en-US" dirty="0"/>
+              <a:rPr lang="en-US" dirty="0"/>
+              <a:t>Kwartler </a:t>
+            </a:r>
           </a:p>
         </p:txBody>
       </p:sp>
@@ -6534,7 +6544,7 @@
           <a:p>
             <a:fld id="{6700A58B-DD98-43D0-B791-721480A02982}" type="datetime1">
               <a:rPr lang="en-US" smtClean="0"/>
-              <a:t>9/5/22</a:t>
+              <a:t>9/18/23</a:t>
             </a:fld>
             <a:endParaRPr lang="en-US"/>
           </a:p>
@@ -6624,10 +6634,9 @@
           <a:lstStyle/>
           <a:p>
             <a:r>
-              <a:rPr lang="en-US"/>
-              <a:t>Kwartler CSCI S-96</a:t>
-            </a:r>
-            <a:endParaRPr lang="en-US" dirty="0"/>
+              <a:rPr lang="en-US" dirty="0"/>
+              <a:t>Kwartler </a:t>
+            </a:r>
           </a:p>
         </p:txBody>
       </p:sp>
@@ -6996,7 +7005,7 @@
           <a:p>
             <a:fld id="{6700A58B-DD98-43D0-B791-721480A02982}" type="datetime1">
               <a:rPr lang="en-US" smtClean="0"/>
-              <a:t>9/5/22</a:t>
+              <a:t>9/18/23</a:t>
             </a:fld>
             <a:endParaRPr lang="en-US"/>
           </a:p>
@@ -7086,10 +7095,9 @@
           <a:lstStyle/>
           <a:p>
             <a:r>
-              <a:rPr lang="en-US"/>
-              <a:t>Kwartler CSCI S-96</a:t>
-            </a:r>
-            <a:endParaRPr lang="en-US" dirty="0"/>
+              <a:rPr lang="en-US" dirty="0"/>
+              <a:t>Kwartler </a:t>
+            </a:r>
           </a:p>
         </p:txBody>
       </p:sp>
@@ -7476,7 +7484,7 @@
           <a:p>
             <a:fld id="{6700A58B-DD98-43D0-B791-721480A02982}" type="datetime1">
               <a:rPr lang="en-US" smtClean="0"/>
-              <a:t>9/5/22</a:t>
+              <a:t>9/18/23</a:t>
             </a:fld>
             <a:endParaRPr lang="en-US"/>
           </a:p>
@@ -7566,10 +7574,9 @@
           <a:lstStyle/>
           <a:p>
             <a:r>
-              <a:rPr lang="en-US"/>
-              <a:t>Kwartler CSCI S-96</a:t>
-            </a:r>
-            <a:endParaRPr lang="en-US" dirty="0"/>
+              <a:rPr lang="en-US" dirty="0"/>
+              <a:t>Kwartler </a:t>
+            </a:r>
           </a:p>
         </p:txBody>
       </p:sp>
@@ -7947,7 +7954,7 @@
           <a:p>
             <a:fld id="{6700A58B-DD98-43D0-B791-721480A02982}" type="datetime1">
               <a:rPr lang="en-US" smtClean="0"/>
-              <a:t>9/5/22</a:t>
+              <a:t>9/18/23</a:t>
             </a:fld>
             <a:endParaRPr lang="en-US"/>
           </a:p>
@@ -8037,10 +8044,9 @@
           <a:lstStyle/>
           <a:p>
             <a:r>
-              <a:rPr lang="en-US"/>
-              <a:t>Kwartler CSCI S-96</a:t>
-            </a:r>
-            <a:endParaRPr lang="en-US" dirty="0"/>
+              <a:rPr lang="en-US" dirty="0"/>
+              <a:t>Kwartler </a:t>
+            </a:r>
           </a:p>
         </p:txBody>
       </p:sp>
@@ -8168,7 +8174,7 @@
           <a:p>
             <a:fld id="{6700A58B-DD98-43D0-B791-721480A02982}" type="datetime1">
               <a:rPr lang="en-US" smtClean="0"/>
-              <a:t>9/5/22</a:t>
+              <a:t>9/18/23</a:t>
             </a:fld>
             <a:endParaRPr lang="en-US"/>
           </a:p>
@@ -8259,10 +8265,9 @@
           <a:lstStyle/>
           <a:p>
             <a:r>
-              <a:rPr lang="en-US"/>
-              <a:t>Kwartler CSCI S-96</a:t>
-            </a:r>
-            <a:endParaRPr lang="en-US" dirty="0"/>
+              <a:rPr lang="en-US" dirty="0"/>
+              <a:t>Kwartler </a:t>
+            </a:r>
           </a:p>
         </p:txBody>
       </p:sp>
@@ -8407,7 +8412,7 @@
           <a:p>
             <a:fld id="{6700A58B-DD98-43D0-B791-721480A02982}" type="datetime1">
               <a:rPr lang="en-US" smtClean="0"/>
-              <a:t>9/5/22</a:t>
+              <a:t>9/18/23</a:t>
             </a:fld>
             <a:endParaRPr lang="en-US"/>
           </a:p>
@@ -8695,7 +8700,7 @@
           <a:p>
             <a:r>
               <a:rPr lang="en-US" dirty="0"/>
-              <a:t>Kwartler CSCI E-96</a:t>
+              <a:t>Kwartler </a:t>
             </a:r>
           </a:p>
         </p:txBody>
@@ -8747,7 +8752,7 @@
           <a:p>
             <a:fld id="{6700A58B-DD98-43D0-B791-721480A02982}" type="datetime1">
               <a:rPr lang="en-US" smtClean="0"/>
-              <a:t>9/5/22</a:t>
+              <a:t>9/18/23</a:t>
             </a:fld>
             <a:endParaRPr lang="en-US"/>
           </a:p>
@@ -9075,7 +9080,7 @@
           <a:p>
             <a:r>
               <a:rPr lang="en-US" dirty="0"/>
-              <a:t>Kwartler CSCI E-96</a:t>
+              <a:t>Kwartler </a:t>
             </a:r>
           </a:p>
         </p:txBody>

</xml_diff>

<commit_message>
small additions and changes made during the lecture
</commit_message>
<xml_diff>
--- a/Lessons/B_IntroToDM_BasicEDA/B_Practice.pptx
+++ b/Lessons/B_IntroToDM_BasicEDA/B_Practice.pptx
@@ -5,7 +5,7 @@
     <p:sldMasterId id="2147483672" r:id="rId1"/>
   </p:sldMasterIdLst>
   <p:notesMasterIdLst>
-    <p:notesMasterId r:id="rId15"/>
+    <p:notesMasterId r:id="rId16"/>
   </p:notesMasterIdLst>
   <p:sldIdLst>
     <p:sldId id="454" r:id="rId2"/>
@@ -18,9 +18,10 @@
     <p:sldId id="539" r:id="rId9"/>
     <p:sldId id="540" r:id="rId10"/>
     <p:sldId id="497" r:id="rId11"/>
-    <p:sldId id="498" r:id="rId12"/>
-    <p:sldId id="471" r:id="rId13"/>
-    <p:sldId id="604" r:id="rId14"/>
+    <p:sldId id="613" r:id="rId12"/>
+    <p:sldId id="498" r:id="rId13"/>
+    <p:sldId id="471" r:id="rId14"/>
+    <p:sldId id="604" r:id="rId15"/>
   </p:sldIdLst>
   <p:sldSz cx="9144000" cy="6858000" type="screen4x3"/>
   <p:notesSz cx="7010400" cy="9296400"/>
@@ -209,7 +210,7 @@
           <a:p>
             <a:fld id="{C333ABA6-B72D-4ED4-A6E7-13A0DAE65F1A}" type="datetimeFigureOut">
               <a:rPr lang="en-US" smtClean="0"/>
-              <a:t>9/18/23</a:t>
+              <a:t>1/29/24</a:t>
             </a:fld>
             <a:endParaRPr lang="en-US"/>
           </a:p>
@@ -692,7 +693,7 @@
           <a:p>
             <a:fld id="{5738B90E-0779-4C36-915C-6F05FCD89456}" type="datetime1">
               <a:rPr lang="en-US" smtClean="0"/>
-              <a:t>9/18/23</a:t>
+              <a:t>1/29/24</a:t>
             </a:fld>
             <a:endParaRPr lang="en-US"/>
           </a:p>
@@ -910,7 +911,7 @@
           <a:p>
             <a:fld id="{7B9EA29D-D431-42FE-B7B6-AAE4454C77D3}" type="datetime1">
               <a:rPr lang="en-US" smtClean="0"/>
-              <a:t>9/18/23</a:t>
+              <a:t>1/29/24</a:t>
             </a:fld>
             <a:endParaRPr lang="en-US"/>
           </a:p>
@@ -1170,7 +1171,7 @@
           <a:p>
             <a:fld id="{690D8A1E-EA8F-46C1-B891-AE0C00D9C314}" type="datetime1">
               <a:rPr lang="en-US" smtClean="0"/>
-              <a:t>9/18/23</a:t>
+              <a:t>1/29/24</a:t>
             </a:fld>
             <a:endParaRPr lang="en-US"/>
           </a:p>
@@ -1464,7 +1465,7 @@
           <a:p>
             <a:fld id="{D753EFC8-4232-4598-94F6-94C0EBAFC469}" type="datetime1">
               <a:rPr lang="en-US" smtClean="0"/>
-              <a:t>9/18/23</a:t>
+              <a:t>1/29/24</a:t>
             </a:fld>
             <a:endParaRPr lang="en-US"/>
           </a:p>
@@ -1779,7 +1780,7 @@
           <a:p>
             <a:fld id="{F3161074-1C18-4AE7-957D-F18524378C85}" type="datetime1">
               <a:rPr lang="en-US" smtClean="0"/>
-              <a:t>9/18/23</a:t>
+              <a:t>1/29/24</a:t>
             </a:fld>
             <a:endParaRPr lang="en-US"/>
           </a:p>
@@ -2053,7 +2054,7 @@
           <a:p>
             <a:fld id="{69BE256C-8D9A-4404-B47D-41A1AE514425}" type="datetime1">
               <a:rPr lang="en-US" smtClean="0"/>
-              <a:t>9/18/23</a:t>
+              <a:t>1/29/24</a:t>
             </a:fld>
             <a:endParaRPr lang="en-US"/>
           </a:p>
@@ -2487,7 +2488,7 @@
           <a:p>
             <a:fld id="{66CB2154-9035-4012-8189-BAAB61C5A5EE}" type="datetime1">
               <a:rPr lang="en-US" smtClean="0"/>
-              <a:t>9/18/23</a:t>
+              <a:t>1/29/24</a:t>
             </a:fld>
             <a:endParaRPr lang="en-US"/>
           </a:p>
@@ -2661,7 +2662,7 @@
           <a:p>
             <a:fld id="{6700A58B-DD98-43D0-B791-721480A02982}" type="datetime1">
               <a:rPr lang="en-US" smtClean="0"/>
-              <a:t>9/18/23</a:t>
+              <a:t>1/29/24</a:t>
             </a:fld>
             <a:endParaRPr lang="en-US"/>
           </a:p>
@@ -2853,7 +2854,7 @@
           <a:p>
             <a:fld id="{7DB6E382-4F61-4E24-BE1A-377EC83D0E3A}" type="datetime1">
               <a:rPr lang="en-US" smtClean="0"/>
-              <a:t>9/18/23</a:t>
+              <a:t>1/29/24</a:t>
             </a:fld>
             <a:endParaRPr lang="en-US"/>
           </a:p>
@@ -3164,7 +3165,7 @@
           <a:p>
             <a:fld id="{4142EED6-FC16-45B9-B8C4-2BC5DBA88325}" type="datetime1">
               <a:rPr lang="en-US" smtClean="0"/>
-              <a:t>9/18/23</a:t>
+              <a:t>1/29/24</a:t>
             </a:fld>
             <a:endParaRPr lang="en-US"/>
           </a:p>
@@ -3482,7 +3483,7 @@
           <a:p>
             <a:fld id="{DF59512B-4F1D-43D7-8819-2F53FEF69650}" type="datetime1">
               <a:rPr lang="en-US" smtClean="0"/>
-              <a:t>9/18/23</a:t>
+              <a:t>1/29/24</a:t>
             </a:fld>
             <a:endParaRPr lang="en-US"/>
           </a:p>
@@ -3758,7 +3759,7 @@
           <a:p>
             <a:fld id="{08437B94-E2BF-44DC-ADC5-B05FC9934E9D}" type="datetime1">
               <a:rPr lang="en-US" smtClean="0"/>
-              <a:t>9/18/23</a:t>
+              <a:t>1/29/24</a:t>
             </a:fld>
             <a:endParaRPr lang="en-US"/>
           </a:p>
@@ -4684,7 +4685,7 @@
           <a:p>
             <a:fld id="{9B19E99B-5349-415A-8E56-8E989211A366}" type="datetime1">
               <a:rPr lang="en-US" smtClean="0"/>
-              <a:t>9/18/23</a:t>
+              <a:t>1/29/24</a:t>
             </a:fld>
             <a:endParaRPr lang="en-US"/>
           </a:p>
@@ -4823,7 +4824,7 @@
           <a:p>
             <a:fld id="{6700A58B-DD98-43D0-B791-721480A02982}" type="datetime1">
               <a:rPr lang="en-US" smtClean="0"/>
-              <a:t>9/18/23</a:t>
+              <a:t>1/29/24</a:t>
             </a:fld>
             <a:endParaRPr lang="en-US"/>
           </a:p>
@@ -5071,7 +5072,13 @@
       </p:grpSpPr>
       <p:sp>
         <p:nvSpPr>
-          <p:cNvPr id="2" name="Date Placeholder 1"/>
+          <p:cNvPr id="2" name="Date Placeholder 1">
+            <a:extLst>
+              <a:ext uri="{FF2B5EF4-FFF2-40B4-BE49-F238E27FC236}">
+                <a16:creationId xmlns:a16="http://schemas.microsoft.com/office/drawing/2014/main" id="{E5C93968-391B-98B3-6759-CA2265552FBD}"/>
+              </a:ext>
+            </a:extLst>
+          </p:cNvPr>
           <p:cNvSpPr>
             <a:spLocks noGrp="1"/>
           </p:cNvSpPr>
@@ -5086,7 +5093,7 @@
           <a:p>
             <a:fld id="{6700A58B-DD98-43D0-B791-721480A02982}" type="datetime1">
               <a:rPr lang="en-US" smtClean="0"/>
-              <a:t>9/18/23</a:t>
+              <a:t>1/29/24</a:t>
             </a:fld>
             <a:endParaRPr lang="en-US"/>
           </a:p>
@@ -5094,7 +5101,13 @@
       </p:sp>
       <p:sp>
         <p:nvSpPr>
-          <p:cNvPr id="3" name="Title 2"/>
+          <p:cNvPr id="3" name="Title 2">
+            <a:extLst>
+              <a:ext uri="{FF2B5EF4-FFF2-40B4-BE49-F238E27FC236}">
+                <a16:creationId xmlns:a16="http://schemas.microsoft.com/office/drawing/2014/main" id="{213ADED7-6FE8-CD73-8991-695EE67ECB73}"/>
+              </a:ext>
+            </a:extLst>
+          </p:cNvPr>
           <p:cNvSpPr>
             <a:spLocks noGrp="1"/>
           </p:cNvSpPr>
@@ -5109,14 +5122,20 @@
           <a:p>
             <a:r>
               <a:rPr lang="en-US" dirty="0"/>
-              <a:t>EDA let me realize a flaw!</a:t>
-            </a:r>
-          </a:p>
-        </p:txBody>
-      </p:sp>
-      <p:sp>
-        <p:nvSpPr>
-          <p:cNvPr id="4" name="Slide Number Placeholder 3"/>
+              <a:t>The task to predict West Nile Virus in Traps</a:t>
+            </a:r>
+          </a:p>
+        </p:txBody>
+      </p:sp>
+      <p:sp>
+        <p:nvSpPr>
+          <p:cNvPr id="4" name="Slide Number Placeholder 3">
+            <a:extLst>
+              <a:ext uri="{FF2B5EF4-FFF2-40B4-BE49-F238E27FC236}">
+                <a16:creationId xmlns:a16="http://schemas.microsoft.com/office/drawing/2014/main" id="{E812B475-75A0-EB42-386A-036FB83E9B36}"/>
+              </a:ext>
+            </a:extLst>
+          </p:cNvPr>
           <p:cNvSpPr>
             <a:spLocks noGrp="1"/>
           </p:cNvSpPr>
@@ -5137,176 +5156,12 @@
           </a:p>
         </p:txBody>
       </p:sp>
-      <p:pic>
-        <p:nvPicPr>
-          <p:cNvPr id="6" name="Picture 5"/>
-          <p:cNvPicPr>
-            <a:picLocks noChangeAspect="1"/>
-          </p:cNvPicPr>
-          <p:nvPr/>
-        </p:nvPicPr>
-        <p:blipFill>
-          <a:blip r:embed="rId2"/>
-          <a:stretch>
-            <a:fillRect/>
-          </a:stretch>
-        </p:blipFill>
-        <p:spPr>
-          <a:xfrm>
-            <a:off x="252248" y="1138925"/>
-            <a:ext cx="6889530" cy="1645365"/>
-          </a:xfrm>
-          <a:prstGeom prst="rect">
-            <a:avLst/>
-          </a:prstGeom>
-        </p:spPr>
-      </p:pic>
-      <p:pic>
-        <p:nvPicPr>
-          <p:cNvPr id="8" name="Picture 7"/>
-          <p:cNvPicPr>
-            <a:picLocks noChangeAspect="1"/>
-          </p:cNvPicPr>
-          <p:nvPr/>
-        </p:nvPicPr>
-        <p:blipFill>
-          <a:blip r:embed="rId3"/>
-          <a:stretch>
-            <a:fillRect/>
-          </a:stretch>
-        </p:blipFill>
-        <p:spPr>
-          <a:xfrm>
-            <a:off x="238126" y="2942233"/>
-            <a:ext cx="7721451" cy="305464"/>
-          </a:xfrm>
-          <a:prstGeom prst="rect">
-            <a:avLst/>
-          </a:prstGeom>
-        </p:spPr>
-      </p:pic>
-      <p:pic>
-        <p:nvPicPr>
-          <p:cNvPr id="10" name="Picture 9"/>
-          <p:cNvPicPr>
-            <a:picLocks noChangeAspect="1"/>
-          </p:cNvPicPr>
-          <p:nvPr/>
-        </p:nvPicPr>
-        <p:blipFill>
-          <a:blip r:embed="rId4"/>
-          <a:stretch>
-            <a:fillRect/>
-          </a:stretch>
-        </p:blipFill>
-        <p:spPr>
-          <a:xfrm>
-            <a:off x="220717" y="3595523"/>
-            <a:ext cx="6982317" cy="1538601"/>
-          </a:xfrm>
-          <a:prstGeom prst="rect">
-            <a:avLst/>
-          </a:prstGeom>
-        </p:spPr>
-      </p:pic>
-      <p:sp>
-        <p:nvSpPr>
-          <p:cNvPr id="11" name="Explosion 2 10"/>
-          <p:cNvSpPr/>
-          <p:nvPr/>
-        </p:nvSpPr>
-        <p:spPr>
-          <a:xfrm>
-            <a:off x="5044964" y="87152"/>
-            <a:ext cx="2435699" cy="1407893"/>
-          </a:xfrm>
-          <a:prstGeom prst="irregularSeal2">
-            <a:avLst/>
-          </a:prstGeom>
-        </p:spPr>
-        <p:style>
-          <a:lnRef idx="2">
-            <a:schemeClr val="accent1">
-              <a:shade val="50000"/>
-            </a:schemeClr>
-          </a:lnRef>
-          <a:fillRef idx="1">
-            <a:schemeClr val="accent1"/>
-          </a:fillRef>
-          <a:effectRef idx="0">
-            <a:schemeClr val="accent1"/>
-          </a:effectRef>
-          <a:fontRef idx="minor">
-            <a:schemeClr val="lt1"/>
-          </a:fontRef>
-        </p:style>
-        <p:txBody>
-          <a:bodyPr rtlCol="0" anchor="ctr"/>
-          <a:lstStyle/>
-          <a:p>
-            <a:pPr algn="ctr"/>
-            <a:r>
-              <a:rPr lang="en-US" sz="800" dirty="0"/>
-              <a:t>Simple EDA by year would show that West Nile was 2x in 2012 </a:t>
-            </a:r>
-          </a:p>
-        </p:txBody>
-      </p:sp>
-      <p:sp>
-        <p:nvSpPr>
-          <p:cNvPr id="12" name="Rectangle 11"/>
-          <p:cNvSpPr/>
-          <p:nvPr/>
-        </p:nvSpPr>
-        <p:spPr>
-          <a:xfrm>
-            <a:off x="141890" y="5470634"/>
-            <a:ext cx="8860220" cy="567559"/>
-          </a:xfrm>
-          <a:prstGeom prst="rect">
-            <a:avLst/>
-          </a:prstGeom>
-          <a:solidFill>
-            <a:schemeClr val="accent6"/>
-          </a:solidFill>
-          <a:ln>
-            <a:noFill/>
-          </a:ln>
-        </p:spPr>
-        <p:style>
-          <a:lnRef idx="2">
-            <a:schemeClr val="accent1">
-              <a:shade val="50000"/>
-            </a:schemeClr>
-          </a:lnRef>
-          <a:fillRef idx="1">
-            <a:schemeClr val="accent1"/>
-          </a:fillRef>
-          <a:effectRef idx="0">
-            <a:schemeClr val="accent1"/>
-          </a:effectRef>
-          <a:fontRef idx="minor">
-            <a:schemeClr val="lt1"/>
-          </a:fontRef>
-        </p:style>
-        <p:txBody>
-          <a:bodyPr rtlCol="0" anchor="ctr"/>
-          <a:lstStyle/>
-          <a:p>
-            <a:pPr algn="ctr"/>
-            <a:r>
-              <a:rPr lang="en-US" dirty="0"/>
-              <a:t>After fitting an algorithm, I merely doubled predictions if they were within 2012 for the test set.  Not great DS but an easy way to move up the leaderboard.</a:t>
-            </a:r>
-          </a:p>
-        </p:txBody>
-      </p:sp>
-      <p:sp>
-        <p:nvSpPr>
-          <p:cNvPr id="13" name="Footer Placeholder 4">
+      <p:sp>
+        <p:nvSpPr>
+          <p:cNvPr id="5" name="Footer Placeholder 4">
             <a:extLst>
               <a:ext uri="{FF2B5EF4-FFF2-40B4-BE49-F238E27FC236}">
-                <a16:creationId xmlns:a16="http://schemas.microsoft.com/office/drawing/2014/main" id="{03B6BE0C-37E3-1A47-BF6C-FF6A302BD3E9}"/>
+                <a16:creationId xmlns:a16="http://schemas.microsoft.com/office/drawing/2014/main" id="{3608F219-6C1F-1FA7-69FA-78DCDF10B3A8}"/>
               </a:ext>
             </a:extLst>
           </p:cNvPr>
@@ -5317,33 +5172,1182 @@
             <p:ph type="ftr" sz="quarter" idx="3"/>
           </p:nvPr>
         </p:nvSpPr>
-        <p:spPr>
-          <a:xfrm>
-            <a:off x="3028950" y="6356351"/>
-            <a:ext cx="3086100" cy="365125"/>
-          </a:xfrm>
-        </p:spPr>
+        <p:spPr/>
         <p:txBody>
           <a:bodyPr/>
           <a:lstStyle/>
           <a:p>
             <a:r>
-              <a:rPr lang="en-US" dirty="0"/>
+              <a:rPr lang="en-US"/>
               <a:t>Kwartler </a:t>
             </a:r>
-          </a:p>
-        </p:txBody>
-      </p:sp>
+            <a:endParaRPr lang="en-US" dirty="0"/>
+          </a:p>
+        </p:txBody>
+      </p:sp>
+      <p:graphicFrame>
+        <p:nvGraphicFramePr>
+          <p:cNvPr id="6" name="Table 5">
+            <a:extLst>
+              <a:ext uri="{FF2B5EF4-FFF2-40B4-BE49-F238E27FC236}">
+                <a16:creationId xmlns:a16="http://schemas.microsoft.com/office/drawing/2014/main" id="{D467DA91-EF28-E158-36B6-3F6F5C7DAF1E}"/>
+              </a:ext>
+            </a:extLst>
+          </p:cNvPr>
+          <p:cNvGraphicFramePr>
+            <a:graphicFrameLocks noGrp="1"/>
+          </p:cNvGraphicFramePr>
+          <p:nvPr>
+            <p:extLst>
+              <p:ext uri="{D42A27DB-BD31-4B8C-83A1-F6EECF244321}">
+                <p14:modId xmlns:p14="http://schemas.microsoft.com/office/powerpoint/2010/main" val="4070384496"/>
+              </p:ext>
+            </p:extLst>
+          </p:nvPr>
+        </p:nvGraphicFramePr>
+        <p:xfrm>
+          <a:off x="312034" y="1304403"/>
+          <a:ext cx="6096000" cy="3098800"/>
+        </p:xfrm>
+        <a:graphic>
+          <a:graphicData uri="http://schemas.openxmlformats.org/drawingml/2006/table">
+            <a:tbl>
+              <a:tblPr firstRow="1" bandRow="1">
+                <a:tableStyleId>{5C22544A-7EE6-4342-B048-85BDC9FD1C3A}</a:tableStyleId>
+              </a:tblPr>
+              <a:tblGrid>
+                <a:gridCol w="1219200">
+                  <a:extLst>
+                    <a:ext uri="{9D8B030D-6E8A-4147-A177-3AD203B41FA5}">
+                      <a16:colId xmlns:a16="http://schemas.microsoft.com/office/drawing/2014/main" val="428749015"/>
+                    </a:ext>
+                  </a:extLst>
+                </a:gridCol>
+                <a:gridCol w="1219200">
+                  <a:extLst>
+                    <a:ext uri="{9D8B030D-6E8A-4147-A177-3AD203B41FA5}">
+                      <a16:colId xmlns:a16="http://schemas.microsoft.com/office/drawing/2014/main" val="1356305113"/>
+                    </a:ext>
+                  </a:extLst>
+                </a:gridCol>
+                <a:gridCol w="1219200">
+                  <a:extLst>
+                    <a:ext uri="{9D8B030D-6E8A-4147-A177-3AD203B41FA5}">
+                      <a16:colId xmlns:a16="http://schemas.microsoft.com/office/drawing/2014/main" val="2361639525"/>
+                    </a:ext>
+                  </a:extLst>
+                </a:gridCol>
+                <a:gridCol w="1219200">
+                  <a:extLst>
+                    <a:ext uri="{9D8B030D-6E8A-4147-A177-3AD203B41FA5}">
+                      <a16:colId xmlns:a16="http://schemas.microsoft.com/office/drawing/2014/main" val="1992473898"/>
+                    </a:ext>
+                  </a:extLst>
+                </a:gridCol>
+                <a:gridCol w="1219200">
+                  <a:extLst>
+                    <a:ext uri="{9D8B030D-6E8A-4147-A177-3AD203B41FA5}">
+                      <a16:colId xmlns:a16="http://schemas.microsoft.com/office/drawing/2014/main" val="1724315288"/>
+                    </a:ext>
+                  </a:extLst>
+                </a:gridCol>
+              </a:tblGrid>
+              <a:tr h="370840">
+                <a:tc>
+                  <a:txBody>
+                    <a:bodyPr/>
+                    <a:lstStyle/>
+                    <a:p>
+                      <a:r>
+                        <a:rPr lang="en-US" dirty="0"/>
+                        <a:t>Date</a:t>
+                      </a:r>
+                    </a:p>
+                  </a:txBody>
+                  <a:tcPr/>
+                </a:tc>
+                <a:tc>
+                  <a:txBody>
+                    <a:bodyPr/>
+                    <a:lstStyle/>
+                    <a:p>
+                      <a:r>
+                        <a:rPr lang="en-US" dirty="0"/>
+                        <a:t>Temperature</a:t>
+                      </a:r>
+                    </a:p>
+                  </a:txBody>
+                  <a:tcPr/>
+                </a:tc>
+                <a:tc>
+                  <a:txBody>
+                    <a:bodyPr/>
+                    <a:lstStyle/>
+                    <a:p>
+                      <a:r>
+                        <a:rPr lang="en-US" dirty="0"/>
+                        <a:t>Humidity</a:t>
+                      </a:r>
+                    </a:p>
+                  </a:txBody>
+                  <a:tcPr/>
+                </a:tc>
+                <a:tc>
+                  <a:txBody>
+                    <a:bodyPr/>
+                    <a:lstStyle/>
+                    <a:p>
+                      <a:r>
+                        <a:rPr lang="en-US" dirty="0"/>
+                        <a:t>…</a:t>
+                      </a:r>
+                    </a:p>
+                  </a:txBody>
+                  <a:tcPr/>
+                </a:tc>
+                <a:tc>
+                  <a:txBody>
+                    <a:bodyPr/>
+                    <a:lstStyle/>
+                    <a:p>
+                      <a:r>
+                        <a:rPr lang="en-US" dirty="0"/>
+                        <a:t>Presence of Virus</a:t>
+                      </a:r>
+                    </a:p>
+                  </a:txBody>
+                  <a:tcPr/>
+                </a:tc>
+                <a:extLst>
+                  <a:ext uri="{0D108BD9-81ED-4DB2-BD59-A6C34878D82A}">
+                    <a16:rowId xmlns:a16="http://schemas.microsoft.com/office/drawing/2014/main" val="1688273566"/>
+                  </a:ext>
+                </a:extLst>
+              </a:tr>
+              <a:tr h="370840">
+                <a:tc>
+                  <a:txBody>
+                    <a:bodyPr/>
+                    <a:lstStyle/>
+                    <a:p>
+                      <a:r>
+                        <a:rPr lang="en-US" dirty="0"/>
+                        <a:t>6/1/2012</a:t>
+                      </a:r>
+                    </a:p>
+                  </a:txBody>
+                  <a:tcPr/>
+                </a:tc>
+                <a:tc>
+                  <a:txBody>
+                    <a:bodyPr/>
+                    <a:lstStyle/>
+                    <a:p>
+                      <a:r>
+                        <a:rPr lang="en-US" dirty="0"/>
+                        <a:t>82</a:t>
+                      </a:r>
+                    </a:p>
+                  </a:txBody>
+                  <a:tcPr/>
+                </a:tc>
+                <a:tc>
+                  <a:txBody>
+                    <a:bodyPr/>
+                    <a:lstStyle/>
+                    <a:p>
+                      <a:r>
+                        <a:rPr lang="en-US" dirty="0"/>
+                        <a:t>50</a:t>
+                      </a:r>
+                    </a:p>
+                  </a:txBody>
+                  <a:tcPr/>
+                </a:tc>
+                <a:tc>
+                  <a:txBody>
+                    <a:bodyPr/>
+                    <a:lstStyle/>
+                    <a:p>
+                      <a:r>
+                        <a:rPr lang="en-US" dirty="0"/>
+                        <a:t>…</a:t>
+                      </a:r>
+                    </a:p>
+                  </a:txBody>
+                  <a:tcPr/>
+                </a:tc>
+                <a:tc>
+                  <a:txBody>
+                    <a:bodyPr/>
+                    <a:lstStyle/>
+                    <a:p>
+                      <a:r>
+                        <a:rPr lang="en-US" dirty="0"/>
+                        <a:t>1</a:t>
+                      </a:r>
+                    </a:p>
+                  </a:txBody>
+                  <a:tcPr/>
+                </a:tc>
+                <a:extLst>
+                  <a:ext uri="{0D108BD9-81ED-4DB2-BD59-A6C34878D82A}">
+                    <a16:rowId xmlns:a16="http://schemas.microsoft.com/office/drawing/2014/main" val="2819347166"/>
+                  </a:ext>
+                </a:extLst>
+              </a:tr>
+              <a:tr h="370840">
+                <a:tc>
+                  <a:txBody>
+                    <a:bodyPr/>
+                    <a:lstStyle/>
+                    <a:p>
+                      <a:r>
+                        <a:rPr lang="en-US" dirty="0"/>
+                        <a:t>5/15/2011</a:t>
+                      </a:r>
+                    </a:p>
+                  </a:txBody>
+                  <a:tcPr/>
+                </a:tc>
+                <a:tc>
+                  <a:txBody>
+                    <a:bodyPr/>
+                    <a:lstStyle/>
+                    <a:p>
+                      <a:r>
+                        <a:rPr lang="en-US" dirty="0"/>
+                        <a:t>84</a:t>
+                      </a:r>
+                    </a:p>
+                  </a:txBody>
+                  <a:tcPr/>
+                </a:tc>
+                <a:tc>
+                  <a:txBody>
+                    <a:bodyPr/>
+                    <a:lstStyle/>
+                    <a:p>
+                      <a:r>
+                        <a:rPr lang="en-US" dirty="0"/>
+                        <a:t>60</a:t>
+                      </a:r>
+                    </a:p>
+                  </a:txBody>
+                  <a:tcPr/>
+                </a:tc>
+                <a:tc>
+                  <a:txBody>
+                    <a:bodyPr/>
+                    <a:lstStyle/>
+                    <a:p>
+                      <a:r>
+                        <a:rPr lang="en-US" dirty="0"/>
+                        <a:t>…</a:t>
+                      </a:r>
+                    </a:p>
+                  </a:txBody>
+                  <a:tcPr/>
+                </a:tc>
+                <a:tc>
+                  <a:txBody>
+                    <a:bodyPr/>
+                    <a:lstStyle/>
+                    <a:p>
+                      <a:r>
+                        <a:rPr lang="en-US" dirty="0"/>
+                        <a:t>0</a:t>
+                      </a:r>
+                    </a:p>
+                  </a:txBody>
+                  <a:tcPr/>
+                </a:tc>
+                <a:extLst>
+                  <a:ext uri="{0D108BD9-81ED-4DB2-BD59-A6C34878D82A}">
+                    <a16:rowId xmlns:a16="http://schemas.microsoft.com/office/drawing/2014/main" val="2372433077"/>
+                  </a:ext>
+                </a:extLst>
+              </a:tr>
+              <a:tr h="370840">
+                <a:tc>
+                  <a:txBody>
+                    <a:bodyPr/>
+                    <a:lstStyle/>
+                    <a:p>
+                      <a:r>
+                        <a:rPr lang="en-US" dirty="0"/>
+                        <a:t>5/30/2011</a:t>
+                      </a:r>
+                    </a:p>
+                  </a:txBody>
+                  <a:tcPr/>
+                </a:tc>
+                <a:tc>
+                  <a:txBody>
+                    <a:bodyPr/>
+                    <a:lstStyle/>
+                    <a:p>
+                      <a:r>
+                        <a:rPr lang="en-US" dirty="0"/>
+                        <a:t>76</a:t>
+                      </a:r>
+                    </a:p>
+                  </a:txBody>
+                  <a:tcPr/>
+                </a:tc>
+                <a:tc>
+                  <a:txBody>
+                    <a:bodyPr/>
+                    <a:lstStyle/>
+                    <a:p>
+                      <a:r>
+                        <a:rPr lang="en-US" dirty="0"/>
+                        <a:t>35</a:t>
+                      </a:r>
+                    </a:p>
+                  </a:txBody>
+                  <a:tcPr/>
+                </a:tc>
+                <a:tc>
+                  <a:txBody>
+                    <a:bodyPr/>
+                    <a:lstStyle/>
+                    <a:p>
+                      <a:r>
+                        <a:rPr lang="en-US" dirty="0"/>
+                        <a:t>…</a:t>
+                      </a:r>
+                    </a:p>
+                  </a:txBody>
+                  <a:tcPr/>
+                </a:tc>
+                <a:tc>
+                  <a:txBody>
+                    <a:bodyPr/>
+                    <a:lstStyle/>
+                    <a:p>
+                      <a:r>
+                        <a:rPr lang="en-US" dirty="0"/>
+                        <a:t>0</a:t>
+                      </a:r>
+                    </a:p>
+                  </a:txBody>
+                  <a:tcPr/>
+                </a:tc>
+                <a:extLst>
+                  <a:ext uri="{0D108BD9-81ED-4DB2-BD59-A6C34878D82A}">
+                    <a16:rowId xmlns:a16="http://schemas.microsoft.com/office/drawing/2014/main" val="1313434916"/>
+                  </a:ext>
+                </a:extLst>
+              </a:tr>
+              <a:tr h="370840">
+                <a:tc>
+                  <a:txBody>
+                    <a:bodyPr/>
+                    <a:lstStyle/>
+                    <a:p>
+                      <a:r>
+                        <a:rPr lang="en-US" dirty="0"/>
+                        <a:t>7/4/2012</a:t>
+                      </a:r>
+                    </a:p>
+                  </a:txBody>
+                  <a:tcPr/>
+                </a:tc>
+                <a:tc>
+                  <a:txBody>
+                    <a:bodyPr/>
+                    <a:lstStyle/>
+                    <a:p>
+                      <a:r>
+                        <a:rPr lang="en-US" dirty="0"/>
+                        <a:t>97</a:t>
+                      </a:r>
+                    </a:p>
+                  </a:txBody>
+                  <a:tcPr/>
+                </a:tc>
+                <a:tc>
+                  <a:txBody>
+                    <a:bodyPr/>
+                    <a:lstStyle/>
+                    <a:p>
+                      <a:r>
+                        <a:rPr lang="en-US" dirty="0"/>
+                        <a:t>85</a:t>
+                      </a:r>
+                    </a:p>
+                  </a:txBody>
+                  <a:tcPr/>
+                </a:tc>
+                <a:tc>
+                  <a:txBody>
+                    <a:bodyPr/>
+                    <a:lstStyle/>
+                    <a:p>
+                      <a:r>
+                        <a:rPr lang="en-US" dirty="0"/>
+                        <a:t>…</a:t>
+                      </a:r>
+                    </a:p>
+                  </a:txBody>
+                  <a:tcPr/>
+                </a:tc>
+                <a:tc>
+                  <a:txBody>
+                    <a:bodyPr/>
+                    <a:lstStyle/>
+                    <a:p>
+                      <a:r>
+                        <a:rPr lang="en-US" dirty="0"/>
+                        <a:t>1</a:t>
+                      </a:r>
+                    </a:p>
+                  </a:txBody>
+                  <a:tcPr/>
+                </a:tc>
+                <a:extLst>
+                  <a:ext uri="{0D108BD9-81ED-4DB2-BD59-A6C34878D82A}">
+                    <a16:rowId xmlns:a16="http://schemas.microsoft.com/office/drawing/2014/main" val="1718784159"/>
+                  </a:ext>
+                </a:extLst>
+              </a:tr>
+              <a:tr h="370840">
+                <a:tc>
+                  <a:txBody>
+                    <a:bodyPr/>
+                    <a:lstStyle/>
+                    <a:p>
+                      <a:r>
+                        <a:rPr lang="en-US" dirty="0"/>
+                        <a:t>7/15/2010</a:t>
+                      </a:r>
+                    </a:p>
+                  </a:txBody>
+                  <a:tcPr/>
+                </a:tc>
+                <a:tc>
+                  <a:txBody>
+                    <a:bodyPr/>
+                    <a:lstStyle/>
+                    <a:p>
+                      <a:r>
+                        <a:rPr lang="en-US" dirty="0"/>
+                        <a:t>89</a:t>
+                      </a:r>
+                    </a:p>
+                  </a:txBody>
+                  <a:tcPr/>
+                </a:tc>
+                <a:tc>
+                  <a:txBody>
+                    <a:bodyPr/>
+                    <a:lstStyle/>
+                    <a:p>
+                      <a:r>
+                        <a:rPr lang="en-US" dirty="0"/>
+                        <a:t>75</a:t>
+                      </a:r>
+                    </a:p>
+                  </a:txBody>
+                  <a:tcPr/>
+                </a:tc>
+                <a:tc>
+                  <a:txBody>
+                    <a:bodyPr/>
+                    <a:lstStyle/>
+                    <a:p>
+                      <a:r>
+                        <a:rPr lang="en-US" dirty="0"/>
+                        <a:t>…</a:t>
+                      </a:r>
+                    </a:p>
+                  </a:txBody>
+                  <a:tcPr/>
+                </a:tc>
+                <a:tc>
+                  <a:txBody>
+                    <a:bodyPr/>
+                    <a:lstStyle/>
+                    <a:p>
+                      <a:r>
+                        <a:rPr lang="en-US" dirty="0"/>
+                        <a:t>1</a:t>
+                      </a:r>
+                    </a:p>
+                  </a:txBody>
+                  <a:tcPr/>
+                </a:tc>
+                <a:extLst>
+                  <a:ext uri="{0D108BD9-81ED-4DB2-BD59-A6C34878D82A}">
+                    <a16:rowId xmlns:a16="http://schemas.microsoft.com/office/drawing/2014/main" val="2965125095"/>
+                  </a:ext>
+                </a:extLst>
+              </a:tr>
+              <a:tr h="370840">
+                <a:tc>
+                  <a:txBody>
+                    <a:bodyPr/>
+                    <a:lstStyle/>
+                    <a:p>
+                      <a:r>
+                        <a:rPr lang="en-US" dirty="0"/>
+                        <a:t>6/12/2010</a:t>
+                      </a:r>
+                    </a:p>
+                  </a:txBody>
+                  <a:tcPr/>
+                </a:tc>
+                <a:tc>
+                  <a:txBody>
+                    <a:bodyPr/>
+                    <a:lstStyle/>
+                    <a:p>
+                      <a:r>
+                        <a:rPr lang="en-US" dirty="0"/>
+                        <a:t>78</a:t>
+                      </a:r>
+                    </a:p>
+                  </a:txBody>
+                  <a:tcPr/>
+                </a:tc>
+                <a:tc>
+                  <a:txBody>
+                    <a:bodyPr/>
+                    <a:lstStyle/>
+                    <a:p>
+                      <a:r>
+                        <a:rPr lang="en-US" dirty="0"/>
+                        <a:t>75</a:t>
+                      </a:r>
+                    </a:p>
+                  </a:txBody>
+                  <a:tcPr/>
+                </a:tc>
+                <a:tc>
+                  <a:txBody>
+                    <a:bodyPr/>
+                    <a:lstStyle/>
+                    <a:p>
+                      <a:r>
+                        <a:rPr lang="en-US" dirty="0"/>
+                        <a:t>…</a:t>
+                      </a:r>
+                    </a:p>
+                  </a:txBody>
+                  <a:tcPr/>
+                </a:tc>
+                <a:tc>
+                  <a:txBody>
+                    <a:bodyPr/>
+                    <a:lstStyle/>
+                    <a:p>
+                      <a:r>
+                        <a:rPr lang="en-US" dirty="0"/>
+                        <a:t>0</a:t>
+                      </a:r>
+                    </a:p>
+                  </a:txBody>
+                  <a:tcPr/>
+                </a:tc>
+                <a:extLst>
+                  <a:ext uri="{0D108BD9-81ED-4DB2-BD59-A6C34878D82A}">
+                    <a16:rowId xmlns:a16="http://schemas.microsoft.com/office/drawing/2014/main" val="3116034017"/>
+                  </a:ext>
+                </a:extLst>
+              </a:tr>
+              <a:tr h="370840">
+                <a:tc>
+                  <a:txBody>
+                    <a:bodyPr/>
+                    <a:lstStyle/>
+                    <a:p>
+                      <a:r>
+                        <a:rPr lang="en-US" dirty="0"/>
+                        <a:t>8/3/2012</a:t>
+                      </a:r>
+                    </a:p>
+                  </a:txBody>
+                  <a:tcPr/>
+                </a:tc>
+                <a:tc>
+                  <a:txBody>
+                    <a:bodyPr/>
+                    <a:lstStyle/>
+                    <a:p>
+                      <a:r>
+                        <a:rPr lang="en-US" dirty="0"/>
+                        <a:t>84</a:t>
+                      </a:r>
+                    </a:p>
+                  </a:txBody>
+                  <a:tcPr/>
+                </a:tc>
+                <a:tc>
+                  <a:txBody>
+                    <a:bodyPr/>
+                    <a:lstStyle/>
+                    <a:p>
+                      <a:r>
+                        <a:rPr lang="en-US" dirty="0"/>
+                        <a:t>45</a:t>
+                      </a:r>
+                    </a:p>
+                  </a:txBody>
+                  <a:tcPr/>
+                </a:tc>
+                <a:tc>
+                  <a:txBody>
+                    <a:bodyPr/>
+                    <a:lstStyle/>
+                    <a:p>
+                      <a:r>
+                        <a:rPr lang="en-US" dirty="0"/>
+                        <a:t>…</a:t>
+                      </a:r>
+                    </a:p>
+                  </a:txBody>
+                  <a:tcPr/>
+                </a:tc>
+                <a:tc>
+                  <a:txBody>
+                    <a:bodyPr/>
+                    <a:lstStyle/>
+                    <a:p>
+                      <a:r>
+                        <a:rPr lang="en-US" dirty="0"/>
+                        <a:t>1</a:t>
+                      </a:r>
+                    </a:p>
+                  </a:txBody>
+                  <a:tcPr/>
+                </a:tc>
+                <a:extLst>
+                  <a:ext uri="{0D108BD9-81ED-4DB2-BD59-A6C34878D82A}">
+                    <a16:rowId xmlns:a16="http://schemas.microsoft.com/office/drawing/2014/main" val="2487065601"/>
+                  </a:ext>
+                </a:extLst>
+              </a:tr>
+            </a:tbl>
+          </a:graphicData>
+        </a:graphic>
+      </p:graphicFrame>
+      <p:graphicFrame>
+        <p:nvGraphicFramePr>
+          <p:cNvPr id="7" name="Table 6">
+            <a:extLst>
+              <a:ext uri="{FF2B5EF4-FFF2-40B4-BE49-F238E27FC236}">
+                <a16:creationId xmlns:a16="http://schemas.microsoft.com/office/drawing/2014/main" id="{390F7217-6978-EEC4-F7E5-11B3AFE67CB9}"/>
+              </a:ext>
+            </a:extLst>
+          </p:cNvPr>
+          <p:cNvGraphicFramePr>
+            <a:graphicFrameLocks noGrp="1"/>
+          </p:cNvGraphicFramePr>
+          <p:nvPr>
+            <p:extLst>
+              <p:ext uri="{D42A27DB-BD31-4B8C-83A1-F6EECF244321}">
+                <p14:modId xmlns:p14="http://schemas.microsoft.com/office/powerpoint/2010/main" val="246895491"/>
+              </p:ext>
+            </p:extLst>
+          </p:nvPr>
+        </p:nvGraphicFramePr>
+        <p:xfrm>
+          <a:off x="312034" y="4552633"/>
+          <a:ext cx="6096000" cy="1986280"/>
+        </p:xfrm>
+        <a:graphic>
+          <a:graphicData uri="http://schemas.openxmlformats.org/drawingml/2006/table">
+            <a:tbl>
+              <a:tblPr firstRow="1" bandRow="1">
+                <a:tableStyleId>{5C22544A-7EE6-4342-B048-85BDC9FD1C3A}</a:tableStyleId>
+              </a:tblPr>
+              <a:tblGrid>
+                <a:gridCol w="1219200">
+                  <a:extLst>
+                    <a:ext uri="{9D8B030D-6E8A-4147-A177-3AD203B41FA5}">
+                      <a16:colId xmlns:a16="http://schemas.microsoft.com/office/drawing/2014/main" val="428749015"/>
+                    </a:ext>
+                  </a:extLst>
+                </a:gridCol>
+                <a:gridCol w="1219200">
+                  <a:extLst>
+                    <a:ext uri="{9D8B030D-6E8A-4147-A177-3AD203B41FA5}">
+                      <a16:colId xmlns:a16="http://schemas.microsoft.com/office/drawing/2014/main" val="1356305113"/>
+                    </a:ext>
+                  </a:extLst>
+                </a:gridCol>
+                <a:gridCol w="1219200">
+                  <a:extLst>
+                    <a:ext uri="{9D8B030D-6E8A-4147-A177-3AD203B41FA5}">
+                      <a16:colId xmlns:a16="http://schemas.microsoft.com/office/drawing/2014/main" val="2361639525"/>
+                    </a:ext>
+                  </a:extLst>
+                </a:gridCol>
+                <a:gridCol w="1219200">
+                  <a:extLst>
+                    <a:ext uri="{9D8B030D-6E8A-4147-A177-3AD203B41FA5}">
+                      <a16:colId xmlns:a16="http://schemas.microsoft.com/office/drawing/2014/main" val="1992473898"/>
+                    </a:ext>
+                  </a:extLst>
+                </a:gridCol>
+                <a:gridCol w="1219200">
+                  <a:extLst>
+                    <a:ext uri="{9D8B030D-6E8A-4147-A177-3AD203B41FA5}">
+                      <a16:colId xmlns:a16="http://schemas.microsoft.com/office/drawing/2014/main" val="1724315288"/>
+                    </a:ext>
+                  </a:extLst>
+                </a:gridCol>
+              </a:tblGrid>
+              <a:tr h="370840">
+                <a:tc>
+                  <a:txBody>
+                    <a:bodyPr/>
+                    <a:lstStyle/>
+                    <a:p>
+                      <a:r>
+                        <a:rPr lang="en-US" dirty="0"/>
+                        <a:t>Date</a:t>
+                      </a:r>
+                    </a:p>
+                  </a:txBody>
+                  <a:tcPr/>
+                </a:tc>
+                <a:tc>
+                  <a:txBody>
+                    <a:bodyPr/>
+                    <a:lstStyle/>
+                    <a:p>
+                      <a:r>
+                        <a:rPr lang="en-US" dirty="0"/>
+                        <a:t>Temperature</a:t>
+                      </a:r>
+                    </a:p>
+                  </a:txBody>
+                  <a:tcPr/>
+                </a:tc>
+                <a:tc>
+                  <a:txBody>
+                    <a:bodyPr/>
+                    <a:lstStyle/>
+                    <a:p>
+                      <a:r>
+                        <a:rPr lang="en-US" dirty="0"/>
+                        <a:t>Humidity</a:t>
+                      </a:r>
+                    </a:p>
+                  </a:txBody>
+                  <a:tcPr/>
+                </a:tc>
+                <a:tc>
+                  <a:txBody>
+                    <a:bodyPr/>
+                    <a:lstStyle/>
+                    <a:p>
+                      <a:r>
+                        <a:rPr lang="en-US" dirty="0"/>
+                        <a:t>…</a:t>
+                      </a:r>
+                    </a:p>
+                  </a:txBody>
+                  <a:tcPr/>
+                </a:tc>
+                <a:tc>
+                  <a:txBody>
+                    <a:bodyPr/>
+                    <a:lstStyle/>
+                    <a:p>
+                      <a:r>
+                        <a:rPr lang="en-US" dirty="0"/>
+                        <a:t>Presence of Virus</a:t>
+                      </a:r>
+                    </a:p>
+                  </a:txBody>
+                  <a:tcPr/>
+                </a:tc>
+                <a:extLst>
+                  <a:ext uri="{0D108BD9-81ED-4DB2-BD59-A6C34878D82A}">
+                    <a16:rowId xmlns:a16="http://schemas.microsoft.com/office/drawing/2014/main" val="1688273566"/>
+                  </a:ext>
+                </a:extLst>
+              </a:tr>
+              <a:tr h="370840">
+                <a:tc>
+                  <a:txBody>
+                    <a:bodyPr/>
+                    <a:lstStyle/>
+                    <a:p>
+                      <a:r>
+                        <a:rPr lang="en-US" dirty="0"/>
+                        <a:t>6/1/2012</a:t>
+                      </a:r>
+                    </a:p>
+                  </a:txBody>
+                  <a:tcPr/>
+                </a:tc>
+                <a:tc>
+                  <a:txBody>
+                    <a:bodyPr/>
+                    <a:lstStyle/>
+                    <a:p>
+                      <a:r>
+                        <a:rPr lang="en-US" dirty="0"/>
+                        <a:t>82</a:t>
+                      </a:r>
+                    </a:p>
+                  </a:txBody>
+                  <a:tcPr/>
+                </a:tc>
+                <a:tc>
+                  <a:txBody>
+                    <a:bodyPr/>
+                    <a:lstStyle/>
+                    <a:p>
+                      <a:r>
+                        <a:rPr lang="en-US" dirty="0"/>
+                        <a:t>50</a:t>
+                      </a:r>
+                    </a:p>
+                  </a:txBody>
+                  <a:tcPr/>
+                </a:tc>
+                <a:tc>
+                  <a:txBody>
+                    <a:bodyPr/>
+                    <a:lstStyle/>
+                    <a:p>
+                      <a:r>
+                        <a:rPr lang="en-US" dirty="0"/>
+                        <a:t>…</a:t>
+                      </a:r>
+                    </a:p>
+                  </a:txBody>
+                  <a:tcPr/>
+                </a:tc>
+                <a:tc>
+                  <a:txBody>
+                    <a:bodyPr/>
+                    <a:lstStyle/>
+                    <a:p>
+                      <a:r>
+                        <a:rPr lang="en-US" dirty="0"/>
+                        <a:t>1</a:t>
+                      </a:r>
+                    </a:p>
+                  </a:txBody>
+                  <a:tcPr/>
+                </a:tc>
+                <a:extLst>
+                  <a:ext uri="{0D108BD9-81ED-4DB2-BD59-A6C34878D82A}">
+                    <a16:rowId xmlns:a16="http://schemas.microsoft.com/office/drawing/2014/main" val="2819347166"/>
+                  </a:ext>
+                </a:extLst>
+              </a:tr>
+              <a:tr h="370840">
+                <a:tc>
+                  <a:txBody>
+                    <a:bodyPr/>
+                    <a:lstStyle/>
+                    <a:p>
+                      <a:r>
+                        <a:rPr lang="en-US" dirty="0"/>
+                        <a:t>7/4/2012</a:t>
+                      </a:r>
+                    </a:p>
+                  </a:txBody>
+                  <a:tcPr/>
+                </a:tc>
+                <a:tc>
+                  <a:txBody>
+                    <a:bodyPr/>
+                    <a:lstStyle/>
+                    <a:p>
+                      <a:r>
+                        <a:rPr lang="en-US" dirty="0"/>
+                        <a:t>97</a:t>
+                      </a:r>
+                    </a:p>
+                  </a:txBody>
+                  <a:tcPr/>
+                </a:tc>
+                <a:tc>
+                  <a:txBody>
+                    <a:bodyPr/>
+                    <a:lstStyle/>
+                    <a:p>
+                      <a:r>
+                        <a:rPr lang="en-US" dirty="0"/>
+                        <a:t>85</a:t>
+                      </a:r>
+                    </a:p>
+                  </a:txBody>
+                  <a:tcPr/>
+                </a:tc>
+                <a:tc>
+                  <a:txBody>
+                    <a:bodyPr/>
+                    <a:lstStyle/>
+                    <a:p>
+                      <a:r>
+                        <a:rPr lang="en-US" dirty="0"/>
+                        <a:t>…</a:t>
+                      </a:r>
+                    </a:p>
+                  </a:txBody>
+                  <a:tcPr/>
+                </a:tc>
+                <a:tc>
+                  <a:txBody>
+                    <a:bodyPr/>
+                    <a:lstStyle/>
+                    <a:p>
+                      <a:r>
+                        <a:rPr lang="en-US" dirty="0"/>
+                        <a:t>1</a:t>
+                      </a:r>
+                    </a:p>
+                  </a:txBody>
+                  <a:tcPr/>
+                </a:tc>
+                <a:extLst>
+                  <a:ext uri="{0D108BD9-81ED-4DB2-BD59-A6C34878D82A}">
+                    <a16:rowId xmlns:a16="http://schemas.microsoft.com/office/drawing/2014/main" val="1718784159"/>
+                  </a:ext>
+                </a:extLst>
+              </a:tr>
+              <a:tr h="370840">
+                <a:tc>
+                  <a:txBody>
+                    <a:bodyPr/>
+                    <a:lstStyle/>
+                    <a:p>
+                      <a:r>
+                        <a:rPr lang="en-US" dirty="0"/>
+                        <a:t>7/15/2010</a:t>
+                      </a:r>
+                    </a:p>
+                  </a:txBody>
+                  <a:tcPr/>
+                </a:tc>
+                <a:tc>
+                  <a:txBody>
+                    <a:bodyPr/>
+                    <a:lstStyle/>
+                    <a:p>
+                      <a:r>
+                        <a:rPr lang="en-US" dirty="0"/>
+                        <a:t>89</a:t>
+                      </a:r>
+                    </a:p>
+                  </a:txBody>
+                  <a:tcPr/>
+                </a:tc>
+                <a:tc>
+                  <a:txBody>
+                    <a:bodyPr/>
+                    <a:lstStyle/>
+                    <a:p>
+                      <a:r>
+                        <a:rPr lang="en-US" dirty="0"/>
+                        <a:t>75</a:t>
+                      </a:r>
+                    </a:p>
+                  </a:txBody>
+                  <a:tcPr/>
+                </a:tc>
+                <a:tc>
+                  <a:txBody>
+                    <a:bodyPr/>
+                    <a:lstStyle/>
+                    <a:p>
+                      <a:r>
+                        <a:rPr lang="en-US" dirty="0"/>
+                        <a:t>…</a:t>
+                      </a:r>
+                    </a:p>
+                  </a:txBody>
+                  <a:tcPr/>
+                </a:tc>
+                <a:tc>
+                  <a:txBody>
+                    <a:bodyPr/>
+                    <a:lstStyle/>
+                    <a:p>
+                      <a:r>
+                        <a:rPr lang="en-US" dirty="0"/>
+                        <a:t>1</a:t>
+                      </a:r>
+                    </a:p>
+                  </a:txBody>
+                  <a:tcPr/>
+                </a:tc>
+                <a:extLst>
+                  <a:ext uri="{0D108BD9-81ED-4DB2-BD59-A6C34878D82A}">
+                    <a16:rowId xmlns:a16="http://schemas.microsoft.com/office/drawing/2014/main" val="2965125095"/>
+                  </a:ext>
+                </a:extLst>
+              </a:tr>
+              <a:tr h="370840">
+                <a:tc>
+                  <a:txBody>
+                    <a:bodyPr/>
+                    <a:lstStyle/>
+                    <a:p>
+                      <a:r>
+                        <a:rPr lang="en-US" dirty="0"/>
+                        <a:t>8/3/2012</a:t>
+                      </a:r>
+                    </a:p>
+                  </a:txBody>
+                  <a:tcPr/>
+                </a:tc>
+                <a:tc>
+                  <a:txBody>
+                    <a:bodyPr/>
+                    <a:lstStyle/>
+                    <a:p>
+                      <a:r>
+                        <a:rPr lang="en-US" dirty="0"/>
+                        <a:t>84</a:t>
+                      </a:r>
+                    </a:p>
+                  </a:txBody>
+                  <a:tcPr/>
+                </a:tc>
+                <a:tc>
+                  <a:txBody>
+                    <a:bodyPr/>
+                    <a:lstStyle/>
+                    <a:p>
+                      <a:r>
+                        <a:rPr lang="en-US" dirty="0"/>
+                        <a:t>45</a:t>
+                      </a:r>
+                    </a:p>
+                  </a:txBody>
+                  <a:tcPr/>
+                </a:tc>
+                <a:tc>
+                  <a:txBody>
+                    <a:bodyPr/>
+                    <a:lstStyle/>
+                    <a:p>
+                      <a:r>
+                        <a:rPr lang="en-US" dirty="0"/>
+                        <a:t>…</a:t>
+                      </a:r>
+                    </a:p>
+                  </a:txBody>
+                  <a:tcPr/>
+                </a:tc>
+                <a:tc>
+                  <a:txBody>
+                    <a:bodyPr/>
+                    <a:lstStyle/>
+                    <a:p>
+                      <a:r>
+                        <a:rPr lang="en-US" dirty="0"/>
+                        <a:t>1</a:t>
+                      </a:r>
+                    </a:p>
+                  </a:txBody>
+                  <a:tcPr/>
+                </a:tc>
+                <a:extLst>
+                  <a:ext uri="{0D108BD9-81ED-4DB2-BD59-A6C34878D82A}">
+                    <a16:rowId xmlns:a16="http://schemas.microsoft.com/office/drawing/2014/main" val="2487065601"/>
+                  </a:ext>
+                </a:extLst>
+              </a:tr>
+            </a:tbl>
+          </a:graphicData>
+        </a:graphic>
+      </p:graphicFrame>
     </p:spTree>
     <p:extLst>
       <p:ext uri="{BB962C8B-B14F-4D97-AF65-F5344CB8AC3E}">
-        <p14:creationId xmlns:p14="http://schemas.microsoft.com/office/powerpoint/2010/main" val="1676752698"/>
+        <p14:creationId xmlns:p14="http://schemas.microsoft.com/office/powerpoint/2010/main" val="551251994"/>
       </p:ext>
     </p:extLst>
   </p:cSld>
   <p:clrMapOvr>
     <a:masterClrMapping/>
   </p:clrMapOvr>
+  <p:timing>
+    <p:tnLst>
+      <p:par>
+        <p:cTn id="1" dur="indefinite" restart="never" nodeType="tmRoot">
+          <p:childTnLst>
+            <p:seq concurrent="1" nextAc="seek">
+              <p:cTn id="2" dur="indefinite" nodeType="mainSeq">
+                <p:childTnLst>
+                  <p:par>
+                    <p:cTn id="3" fill="hold">
+                      <p:stCondLst>
+                        <p:cond delay="indefinite"/>
+                      </p:stCondLst>
+                      <p:childTnLst>
+                        <p:par>
+                          <p:cTn id="4" fill="hold">
+                            <p:stCondLst>
+                              <p:cond delay="0"/>
+                            </p:stCondLst>
+                            <p:childTnLst>
+                              <p:par>
+                                <p:cTn id="5" presetID="1" presetClass="entr" presetSubtype="0" fill="hold" nodeType="clickEffect">
+                                  <p:stCondLst>
+                                    <p:cond delay="0"/>
+                                  </p:stCondLst>
+                                  <p:childTnLst>
+                                    <p:set>
+                                      <p:cBhvr>
+                                        <p:cTn id="6" dur="1" fill="hold">
+                                          <p:stCondLst>
+                                            <p:cond delay="0"/>
+                                          </p:stCondLst>
+                                        </p:cTn>
+                                        <p:tgtEl>
+                                          <p:spTgt spid="7"/>
+                                        </p:tgtEl>
+                                        <p:attrNameLst>
+                                          <p:attrName>style.visibility</p:attrName>
+                                        </p:attrNameLst>
+                                      </p:cBhvr>
+                                      <p:to>
+                                        <p:strVal val="visible"/>
+                                      </p:to>
+                                    </p:set>
+                                  </p:childTnLst>
+                                </p:cTn>
+                              </p:par>
+                            </p:childTnLst>
+                          </p:cTn>
+                        </p:par>
+                      </p:childTnLst>
+                    </p:cTn>
+                  </p:par>
+                </p:childTnLst>
+              </p:cTn>
+              <p:prevCondLst>
+                <p:cond evt="onPrev" delay="0">
+                  <p:tgtEl>
+                    <p:sldTgt/>
+                  </p:tgtEl>
+                </p:cond>
+              </p:prevCondLst>
+              <p:nextCondLst>
+                <p:cond evt="onNext" delay="0">
+                  <p:tgtEl>
+                    <p:sldTgt/>
+                  </p:tgtEl>
+                </p:cond>
+              </p:nextCondLst>
+            </p:seq>
+          </p:childTnLst>
+        </p:cTn>
+      </p:par>
+    </p:tnLst>
+  </p:timing>
 </p:sld>
 </file>
 
@@ -5366,6 +6370,301 @@
       </p:grpSpPr>
       <p:sp>
         <p:nvSpPr>
+          <p:cNvPr id="2" name="Date Placeholder 1"/>
+          <p:cNvSpPr>
+            <a:spLocks noGrp="1"/>
+          </p:cNvSpPr>
+          <p:nvPr>
+            <p:ph type="dt" sz="half" idx="10"/>
+          </p:nvPr>
+        </p:nvSpPr>
+        <p:spPr/>
+        <p:txBody>
+          <a:bodyPr/>
+          <a:lstStyle/>
+          <a:p>
+            <a:fld id="{6700A58B-DD98-43D0-B791-721480A02982}" type="datetime1">
+              <a:rPr lang="en-US" smtClean="0"/>
+              <a:t>1/29/24</a:t>
+            </a:fld>
+            <a:endParaRPr lang="en-US"/>
+          </a:p>
+        </p:txBody>
+      </p:sp>
+      <p:sp>
+        <p:nvSpPr>
+          <p:cNvPr id="3" name="Title 2"/>
+          <p:cNvSpPr>
+            <a:spLocks noGrp="1"/>
+          </p:cNvSpPr>
+          <p:nvPr>
+            <p:ph type="title"/>
+          </p:nvPr>
+        </p:nvSpPr>
+        <p:spPr/>
+        <p:txBody>
+          <a:bodyPr/>
+          <a:lstStyle/>
+          <a:p>
+            <a:r>
+              <a:rPr lang="en-US" dirty="0"/>
+              <a:t>EDA let me realize a flaw!</a:t>
+            </a:r>
+          </a:p>
+        </p:txBody>
+      </p:sp>
+      <p:sp>
+        <p:nvSpPr>
+          <p:cNvPr id="4" name="Slide Number Placeholder 3"/>
+          <p:cNvSpPr>
+            <a:spLocks noGrp="1"/>
+          </p:cNvSpPr>
+          <p:nvPr>
+            <p:ph type="sldNum" sz="quarter" idx="12"/>
+          </p:nvPr>
+        </p:nvSpPr>
+        <p:spPr/>
+        <p:txBody>
+          <a:bodyPr/>
+          <a:lstStyle/>
+          <a:p>
+            <a:fld id="{37290FF7-652B-4475-AEAB-8B1A5D23AE09}" type="slidenum">
+              <a:rPr lang="en-US" smtClean="0"/>
+              <a:t>12</a:t>
+            </a:fld>
+            <a:endParaRPr lang="en-US"/>
+          </a:p>
+        </p:txBody>
+      </p:sp>
+      <p:pic>
+        <p:nvPicPr>
+          <p:cNvPr id="6" name="Picture 5"/>
+          <p:cNvPicPr>
+            <a:picLocks noChangeAspect="1"/>
+          </p:cNvPicPr>
+          <p:nvPr/>
+        </p:nvPicPr>
+        <p:blipFill>
+          <a:blip r:embed="rId2"/>
+          <a:stretch>
+            <a:fillRect/>
+          </a:stretch>
+        </p:blipFill>
+        <p:spPr>
+          <a:xfrm>
+            <a:off x="252248" y="1138925"/>
+            <a:ext cx="6889530" cy="1645365"/>
+          </a:xfrm>
+          <a:prstGeom prst="rect">
+            <a:avLst/>
+          </a:prstGeom>
+        </p:spPr>
+      </p:pic>
+      <p:pic>
+        <p:nvPicPr>
+          <p:cNvPr id="8" name="Picture 7"/>
+          <p:cNvPicPr>
+            <a:picLocks noChangeAspect="1"/>
+          </p:cNvPicPr>
+          <p:nvPr/>
+        </p:nvPicPr>
+        <p:blipFill>
+          <a:blip r:embed="rId3"/>
+          <a:stretch>
+            <a:fillRect/>
+          </a:stretch>
+        </p:blipFill>
+        <p:spPr>
+          <a:xfrm>
+            <a:off x="238126" y="2942233"/>
+            <a:ext cx="7721451" cy="305464"/>
+          </a:xfrm>
+          <a:prstGeom prst="rect">
+            <a:avLst/>
+          </a:prstGeom>
+        </p:spPr>
+      </p:pic>
+      <p:pic>
+        <p:nvPicPr>
+          <p:cNvPr id="10" name="Picture 9"/>
+          <p:cNvPicPr>
+            <a:picLocks noChangeAspect="1"/>
+          </p:cNvPicPr>
+          <p:nvPr/>
+        </p:nvPicPr>
+        <p:blipFill>
+          <a:blip r:embed="rId4"/>
+          <a:stretch>
+            <a:fillRect/>
+          </a:stretch>
+        </p:blipFill>
+        <p:spPr>
+          <a:xfrm>
+            <a:off x="220717" y="3595523"/>
+            <a:ext cx="6982317" cy="1538601"/>
+          </a:xfrm>
+          <a:prstGeom prst="rect">
+            <a:avLst/>
+          </a:prstGeom>
+        </p:spPr>
+      </p:pic>
+      <p:sp>
+        <p:nvSpPr>
+          <p:cNvPr id="11" name="Explosion 2 10"/>
+          <p:cNvSpPr/>
+          <p:nvPr/>
+        </p:nvSpPr>
+        <p:spPr>
+          <a:xfrm>
+            <a:off x="5044964" y="87152"/>
+            <a:ext cx="2435699" cy="1407893"/>
+          </a:xfrm>
+          <a:prstGeom prst="irregularSeal2">
+            <a:avLst/>
+          </a:prstGeom>
+        </p:spPr>
+        <p:style>
+          <a:lnRef idx="2">
+            <a:schemeClr val="accent1">
+              <a:shade val="50000"/>
+            </a:schemeClr>
+          </a:lnRef>
+          <a:fillRef idx="1">
+            <a:schemeClr val="accent1"/>
+          </a:fillRef>
+          <a:effectRef idx="0">
+            <a:schemeClr val="accent1"/>
+          </a:effectRef>
+          <a:fontRef idx="minor">
+            <a:schemeClr val="lt1"/>
+          </a:fontRef>
+        </p:style>
+        <p:txBody>
+          <a:bodyPr rtlCol="0" anchor="ctr"/>
+          <a:lstStyle/>
+          <a:p>
+            <a:pPr algn="ctr"/>
+            <a:r>
+              <a:rPr lang="en-US" sz="800" dirty="0"/>
+              <a:t>Simple EDA by year would show that West Nile was 2x in 2012 </a:t>
+            </a:r>
+          </a:p>
+        </p:txBody>
+      </p:sp>
+      <p:sp>
+        <p:nvSpPr>
+          <p:cNvPr id="12" name="Rectangle 11"/>
+          <p:cNvSpPr/>
+          <p:nvPr/>
+        </p:nvSpPr>
+        <p:spPr>
+          <a:xfrm>
+            <a:off x="141890" y="5470634"/>
+            <a:ext cx="8860220" cy="567559"/>
+          </a:xfrm>
+          <a:prstGeom prst="rect">
+            <a:avLst/>
+          </a:prstGeom>
+          <a:solidFill>
+            <a:schemeClr val="accent6"/>
+          </a:solidFill>
+          <a:ln>
+            <a:noFill/>
+          </a:ln>
+        </p:spPr>
+        <p:style>
+          <a:lnRef idx="2">
+            <a:schemeClr val="accent1">
+              <a:shade val="50000"/>
+            </a:schemeClr>
+          </a:lnRef>
+          <a:fillRef idx="1">
+            <a:schemeClr val="accent1"/>
+          </a:fillRef>
+          <a:effectRef idx="0">
+            <a:schemeClr val="accent1"/>
+          </a:effectRef>
+          <a:fontRef idx="minor">
+            <a:schemeClr val="lt1"/>
+          </a:fontRef>
+        </p:style>
+        <p:txBody>
+          <a:bodyPr rtlCol="0" anchor="ctr"/>
+          <a:lstStyle/>
+          <a:p>
+            <a:pPr algn="ctr"/>
+            <a:r>
+              <a:rPr lang="en-US" dirty="0"/>
+              <a:t>After fitting an algorithm, I merely doubled predictions if they were within 2012 for the test set.  Not great DS but an easy way to move up the leaderboard.</a:t>
+            </a:r>
+          </a:p>
+        </p:txBody>
+      </p:sp>
+      <p:sp>
+        <p:nvSpPr>
+          <p:cNvPr id="13" name="Footer Placeholder 4">
+            <a:extLst>
+              <a:ext uri="{FF2B5EF4-FFF2-40B4-BE49-F238E27FC236}">
+                <a16:creationId xmlns:a16="http://schemas.microsoft.com/office/drawing/2014/main" id="{03B6BE0C-37E3-1A47-BF6C-FF6A302BD3E9}"/>
+              </a:ext>
+            </a:extLst>
+          </p:cNvPr>
+          <p:cNvSpPr>
+            <a:spLocks noGrp="1"/>
+          </p:cNvSpPr>
+          <p:nvPr>
+            <p:ph type="ftr" sz="quarter" idx="3"/>
+          </p:nvPr>
+        </p:nvSpPr>
+        <p:spPr>
+          <a:xfrm>
+            <a:off x="3028950" y="6356351"/>
+            <a:ext cx="3086100" cy="365125"/>
+          </a:xfrm>
+        </p:spPr>
+        <p:txBody>
+          <a:bodyPr/>
+          <a:lstStyle/>
+          <a:p>
+            <a:r>
+              <a:rPr lang="en-US" dirty="0"/>
+              <a:t>Kwartler </a:t>
+            </a:r>
+          </a:p>
+        </p:txBody>
+      </p:sp>
+    </p:spTree>
+    <p:extLst>
+      <p:ext uri="{BB962C8B-B14F-4D97-AF65-F5344CB8AC3E}">
+        <p14:creationId xmlns:p14="http://schemas.microsoft.com/office/powerpoint/2010/main" val="1676752698"/>
+      </p:ext>
+    </p:extLst>
+  </p:cSld>
+  <p:clrMapOvr>
+    <a:masterClrMapping/>
+  </p:clrMapOvr>
+</p:sld>
+</file>
+
+<file path=ppt/slides/slide13.xml><?xml version="1.0" encoding="utf-8"?>
+<p:sld xmlns:a="http://schemas.openxmlformats.org/drawingml/2006/main" xmlns:r="http://schemas.openxmlformats.org/officeDocument/2006/relationships" xmlns:p="http://schemas.openxmlformats.org/presentationml/2006/main">
+  <p:cSld>
+    <p:spTree>
+      <p:nvGrpSpPr>
+        <p:cNvPr id="1" name=""/>
+        <p:cNvGrpSpPr/>
+        <p:nvPr/>
+      </p:nvGrpSpPr>
+      <p:grpSpPr>
+        <a:xfrm>
+          <a:off x="0" y="0"/>
+          <a:ext cx="0" cy="0"/>
+          <a:chOff x="0" y="0"/>
+          <a:chExt cx="0" cy="0"/>
+        </a:xfrm>
+      </p:grpSpPr>
+      <p:sp>
+        <p:nvSpPr>
           <p:cNvPr id="3" name="Content Placeholder 2">
             <a:extLst>
               <a:ext uri="{FF2B5EF4-FFF2-40B4-BE49-F238E27FC236}">
@@ -5515,7 +6814,7 @@
           <a:p>
             <a:fld id="{D753EFC8-4232-4598-94F6-94C0EBAFC469}" type="datetime1">
               <a:rPr lang="en-US" smtClean="0"/>
-              <a:t>9/18/23</a:t>
+              <a:t>1/29/24</a:t>
             </a:fld>
             <a:endParaRPr lang="en-US"/>
           </a:p>
@@ -5544,7 +6843,7 @@
           <a:p>
             <a:fld id="{37290FF7-652B-4475-AEAB-8B1A5D23AE09}" type="slidenum">
               <a:rPr lang="en-US" smtClean="0"/>
-              <a:t>12</a:t>
+              <a:t>13</a:t>
             </a:fld>
             <a:endParaRPr lang="en-US"/>
           </a:p>
@@ -6001,7 +7300,7 @@
 </p:sld>
 </file>
 
-<file path=ppt/slides/slide13.xml><?xml version="1.0" encoding="utf-8"?>
+<file path=ppt/slides/slide14.xml><?xml version="1.0" encoding="utf-8"?>
 <p:sld xmlns:a="http://schemas.openxmlformats.org/drawingml/2006/main" xmlns:r="http://schemas.openxmlformats.org/officeDocument/2006/relationships" xmlns:p="http://schemas.openxmlformats.org/presentationml/2006/main">
   <p:cSld>
     <p:spTree>
@@ -6035,7 +7334,7 @@
           <a:p>
             <a:fld id="{6700A58B-DD98-43D0-B791-721480A02982}" type="datetime1">
               <a:rPr lang="en-US" smtClean="0"/>
-              <a:t>9/18/23</a:t>
+              <a:t>1/29/24</a:t>
             </a:fld>
             <a:endParaRPr lang="en-US"/>
           </a:p>
@@ -6080,7 +7379,7 @@
           <a:p>
             <a:fld id="{37290FF7-652B-4475-AEAB-8B1A5D23AE09}" type="slidenum">
               <a:rPr lang="en-US" smtClean="0"/>
-              <a:t>13</a:t>
+              <a:t>14</a:t>
             </a:fld>
             <a:endParaRPr lang="en-US"/>
           </a:p>
@@ -6121,15 +7420,7 @@
             </a:pPr>
             <a:r>
               <a:rPr lang="en-US" sz="2400" dirty="0"/>
-              <a:t>Start </a:t>
-            </a:r>
-            <a:r>
-              <a:rPr lang="en-US" sz="2400" dirty="0" err="1"/>
-              <a:t>okCupid</a:t>
-            </a:r>
-            <a:r>
-              <a:rPr lang="en-US" sz="2400" dirty="0"/>
-              <a:t> Case in code or with </a:t>
+              <a:t>Start Case I in code or with </a:t>
             </a:r>
             <a:r>
               <a:rPr lang="en-US" sz="2400" dirty="0" err="1"/>
@@ -6175,7 +7466,10 @@
               </a:rPr>
               <a:t>www.llmaid.com</a:t>
             </a:r>
-            <a:endParaRPr lang="en-US" sz="2400" dirty="0"/>
+            <a:r>
+              <a:rPr lang="en-US" sz="2400" dirty="0"/>
+              <a:t> (beta)</a:t>
+            </a:r>
           </a:p>
           <a:p>
             <a:pPr marL="285750" indent="-285750">
@@ -6282,7 +7576,7 @@
           <a:p>
             <a:fld id="{6700A58B-DD98-43D0-B791-721480A02982}" type="datetime1">
               <a:rPr lang="en-US" smtClean="0"/>
-              <a:t>9/18/23</a:t>
+              <a:t>1/29/24</a:t>
             </a:fld>
             <a:endParaRPr lang="en-US"/>
           </a:p>
@@ -6544,7 +7838,7 @@
           <a:p>
             <a:fld id="{6700A58B-DD98-43D0-B791-721480A02982}" type="datetime1">
               <a:rPr lang="en-US" smtClean="0"/>
-              <a:t>9/18/23</a:t>
+              <a:t>1/29/24</a:t>
             </a:fld>
             <a:endParaRPr lang="en-US"/>
           </a:p>
@@ -7005,7 +8299,7 @@
           <a:p>
             <a:fld id="{6700A58B-DD98-43D0-B791-721480A02982}" type="datetime1">
               <a:rPr lang="en-US" smtClean="0"/>
-              <a:t>9/18/23</a:t>
+              <a:t>1/29/24</a:t>
             </a:fld>
             <a:endParaRPr lang="en-US"/>
           </a:p>
@@ -7484,7 +8778,7 @@
           <a:p>
             <a:fld id="{6700A58B-DD98-43D0-B791-721480A02982}" type="datetime1">
               <a:rPr lang="en-US" smtClean="0"/>
-              <a:t>9/18/23</a:t>
+              <a:t>1/29/24</a:t>
             </a:fld>
             <a:endParaRPr lang="en-US"/>
           </a:p>
@@ -7954,7 +9248,7 @@
           <a:p>
             <a:fld id="{6700A58B-DD98-43D0-B791-721480A02982}" type="datetime1">
               <a:rPr lang="en-US" smtClean="0"/>
-              <a:t>9/18/23</a:t>
+              <a:t>1/29/24</a:t>
             </a:fld>
             <a:endParaRPr lang="en-US"/>
           </a:p>
@@ -8116,7 +9410,64 @@
           <a:p>
             <a:r>
               <a:rPr lang="en-US" dirty="0"/>
-              <a:t>Pattern of damage among returning plans from bombing runs in WW2.</a:t>
+              <a:t>Pattern of damage among </a:t>
+            </a:r>
+            <a:r>
+              <a:rPr lang="en-US" i="1" dirty="0"/>
+              <a:t>returning</a:t>
+            </a:r>
+            <a:r>
+              <a:rPr lang="en-US" dirty="0"/>
+              <a:t> plans from bombing runs in WW2.</a:t>
+            </a:r>
+          </a:p>
+        </p:txBody>
+      </p:sp>
+      <p:sp>
+        <p:nvSpPr>
+          <p:cNvPr id="6" name="Rectangle 5">
+            <a:extLst>
+              <a:ext uri="{FF2B5EF4-FFF2-40B4-BE49-F238E27FC236}">
+                <a16:creationId xmlns:a16="http://schemas.microsoft.com/office/drawing/2014/main" id="{EE358535-3386-32DB-7CF1-901DE810AC3A}"/>
+              </a:ext>
+            </a:extLst>
+          </p:cNvPr>
+          <p:cNvSpPr/>
+          <p:nvPr/>
+        </p:nvSpPr>
+        <p:spPr>
+          <a:xfrm>
+            <a:off x="457200" y="5875334"/>
+            <a:ext cx="8284464" cy="420370"/>
+          </a:xfrm>
+          <a:prstGeom prst="rect">
+            <a:avLst/>
+          </a:prstGeom>
+        </p:spPr>
+        <p:style>
+          <a:lnRef idx="2">
+            <a:schemeClr val="accent1">
+              <a:shade val="50000"/>
+            </a:schemeClr>
+          </a:lnRef>
+          <a:fillRef idx="1">
+            <a:schemeClr val="accent1"/>
+          </a:fillRef>
+          <a:effectRef idx="0">
+            <a:schemeClr val="accent1"/>
+          </a:effectRef>
+          <a:fontRef idx="minor">
+            <a:schemeClr val="lt1"/>
+          </a:fontRef>
+        </p:style>
+        <p:txBody>
+          <a:bodyPr rtlCol="0" anchor="ctr"/>
+          <a:lstStyle/>
+          <a:p>
+            <a:pPr algn="ctr"/>
+            <a:r>
+              <a:rPr lang="en-US" dirty="0"/>
+              <a:t>Returning is success.  So this is the damage pattern for success.</a:t>
             </a:r>
           </a:p>
         </p:txBody>
@@ -8131,6 +9482,84 @@
   <p:clrMapOvr>
     <a:masterClrMapping/>
   </p:clrMapOvr>
+  <p:timing>
+    <p:tnLst>
+      <p:par>
+        <p:cTn id="1" dur="indefinite" restart="never" nodeType="tmRoot">
+          <p:childTnLst>
+            <p:seq concurrent="1" nextAc="seek">
+              <p:cTn id="2" dur="indefinite" nodeType="mainSeq">
+                <p:childTnLst>
+                  <p:par>
+                    <p:cTn id="3" fill="hold">
+                      <p:stCondLst>
+                        <p:cond delay="indefinite"/>
+                      </p:stCondLst>
+                      <p:childTnLst>
+                        <p:par>
+                          <p:cTn id="4" fill="hold">
+                            <p:stCondLst>
+                              <p:cond delay="0"/>
+                            </p:stCondLst>
+                            <p:childTnLst>
+                              <p:par>
+                                <p:cTn id="5" presetID="1" presetClass="entr" presetSubtype="0" fill="hold" grpId="0" nodeType="clickEffect">
+                                  <p:stCondLst>
+                                    <p:cond delay="0"/>
+                                  </p:stCondLst>
+                                  <p:childTnLst>
+                                    <p:set>
+                                      <p:cBhvr>
+                                        <p:cTn id="6" dur="1" fill="hold">
+                                          <p:stCondLst>
+                                            <p:cond delay="0"/>
+                                          </p:stCondLst>
+                                        </p:cTn>
+                                        <p:tgtEl>
+                                          <p:spTgt spid="6"/>
+                                        </p:tgtEl>
+                                        <p:attrNameLst>
+                                          <p:attrName>style.visibility</p:attrName>
+                                        </p:attrNameLst>
+                                      </p:cBhvr>
+                                      <p:to>
+                                        <p:strVal val="visible"/>
+                                      </p:to>
+                                    </p:set>
+                                  </p:childTnLst>
+                                </p:cTn>
+                              </p:par>
+                            </p:childTnLst>
+                          </p:cTn>
+                        </p:par>
+                      </p:childTnLst>
+                    </p:cTn>
+                  </p:par>
+                </p:childTnLst>
+              </p:cTn>
+              <p:prevCondLst>
+                <p:cond evt="onPrev" delay="0">
+                  <p:tgtEl>
+                    <p:sldTgt/>
+                  </p:tgtEl>
+                </p:cond>
+              </p:prevCondLst>
+              <p:nextCondLst>
+                <p:cond evt="onNext" delay="0">
+                  <p:tgtEl>
+                    <p:sldTgt/>
+                  </p:tgtEl>
+                </p:cond>
+              </p:nextCondLst>
+            </p:seq>
+          </p:childTnLst>
+        </p:cTn>
+      </p:par>
+    </p:tnLst>
+    <p:bldLst>
+      <p:bldP spid="6" grpId="0" animBg="1"/>
+    </p:bldLst>
+  </p:timing>
 </p:sld>
 </file>
 
@@ -8174,7 +9603,7 @@
           <a:p>
             <a:fld id="{6700A58B-DD98-43D0-B791-721480A02982}" type="datetime1">
               <a:rPr lang="en-US" smtClean="0"/>
-              <a:t>9/18/23</a:t>
+              <a:t>1/29/24</a:t>
             </a:fld>
             <a:endParaRPr lang="en-US"/>
           </a:p>
@@ -8412,7 +9841,7 @@
           <a:p>
             <a:fld id="{6700A58B-DD98-43D0-B791-721480A02982}" type="datetime1">
               <a:rPr lang="en-US" smtClean="0"/>
-              <a:t>9/18/23</a:t>
+              <a:t>1/29/24</a:t>
             </a:fld>
             <a:endParaRPr lang="en-US"/>
           </a:p>
@@ -8752,7 +10181,7 @@
           <a:p>
             <a:fld id="{6700A58B-DD98-43D0-B791-721480A02982}" type="datetime1">
               <a:rPr lang="en-US" smtClean="0"/>
-              <a:t>9/18/23</a:t>
+              <a:t>1/29/24</a:t>
             </a:fld>
             <a:endParaRPr lang="en-US"/>
           </a:p>

</xml_diff>

<commit_message>
small update to B pptx
</commit_message>
<xml_diff>
--- a/Lessons/B_IntroToDM_BasicEDA/B_Practice.pptx
+++ b/Lessons/B_IntroToDM_BasicEDA/B_Practice.pptx
@@ -210,7 +210,7 @@
           <a:p>
             <a:fld id="{C333ABA6-B72D-4ED4-A6E7-13A0DAE65F1A}" type="datetimeFigureOut">
               <a:rPr lang="en-US" smtClean="0"/>
-              <a:t>1/29/24</a:t>
+              <a:t>2/2/26</a:t>
             </a:fld>
             <a:endParaRPr lang="en-US"/>
           </a:p>
@@ -693,7 +693,7 @@
           <a:p>
             <a:fld id="{5738B90E-0779-4C36-915C-6F05FCD89456}" type="datetime1">
               <a:rPr lang="en-US" smtClean="0"/>
-              <a:t>1/29/24</a:t>
+              <a:t>2/2/26</a:t>
             </a:fld>
             <a:endParaRPr lang="en-US"/>
           </a:p>
@@ -911,7 +911,7 @@
           <a:p>
             <a:fld id="{7B9EA29D-D431-42FE-B7B6-AAE4454C77D3}" type="datetime1">
               <a:rPr lang="en-US" smtClean="0"/>
-              <a:t>1/29/24</a:t>
+              <a:t>2/2/26</a:t>
             </a:fld>
             <a:endParaRPr lang="en-US"/>
           </a:p>
@@ -1171,7 +1171,7 @@
           <a:p>
             <a:fld id="{690D8A1E-EA8F-46C1-B891-AE0C00D9C314}" type="datetime1">
               <a:rPr lang="en-US" smtClean="0"/>
-              <a:t>1/29/24</a:t>
+              <a:t>2/2/26</a:t>
             </a:fld>
             <a:endParaRPr lang="en-US"/>
           </a:p>
@@ -1465,7 +1465,7 @@
           <a:p>
             <a:fld id="{D753EFC8-4232-4598-94F6-94C0EBAFC469}" type="datetime1">
               <a:rPr lang="en-US" smtClean="0"/>
-              <a:t>1/29/24</a:t>
+              <a:t>2/2/26</a:t>
             </a:fld>
             <a:endParaRPr lang="en-US"/>
           </a:p>
@@ -1780,7 +1780,7 @@
           <a:p>
             <a:fld id="{F3161074-1C18-4AE7-957D-F18524378C85}" type="datetime1">
               <a:rPr lang="en-US" smtClean="0"/>
-              <a:t>1/29/24</a:t>
+              <a:t>2/2/26</a:t>
             </a:fld>
             <a:endParaRPr lang="en-US"/>
           </a:p>
@@ -2054,7 +2054,7 @@
           <a:p>
             <a:fld id="{69BE256C-8D9A-4404-B47D-41A1AE514425}" type="datetime1">
               <a:rPr lang="en-US" smtClean="0"/>
-              <a:t>1/29/24</a:t>
+              <a:t>2/2/26</a:t>
             </a:fld>
             <a:endParaRPr lang="en-US"/>
           </a:p>
@@ -2488,7 +2488,7 @@
           <a:p>
             <a:fld id="{66CB2154-9035-4012-8189-BAAB61C5A5EE}" type="datetime1">
               <a:rPr lang="en-US" smtClean="0"/>
-              <a:t>1/29/24</a:t>
+              <a:t>2/2/26</a:t>
             </a:fld>
             <a:endParaRPr lang="en-US"/>
           </a:p>
@@ -2662,7 +2662,7 @@
           <a:p>
             <a:fld id="{6700A58B-DD98-43D0-B791-721480A02982}" type="datetime1">
               <a:rPr lang="en-US" smtClean="0"/>
-              <a:t>1/29/24</a:t>
+              <a:t>2/2/26</a:t>
             </a:fld>
             <a:endParaRPr lang="en-US"/>
           </a:p>
@@ -2854,7 +2854,7 @@
           <a:p>
             <a:fld id="{7DB6E382-4F61-4E24-BE1A-377EC83D0E3A}" type="datetime1">
               <a:rPr lang="en-US" smtClean="0"/>
-              <a:t>1/29/24</a:t>
+              <a:t>2/2/26</a:t>
             </a:fld>
             <a:endParaRPr lang="en-US"/>
           </a:p>
@@ -3165,7 +3165,7 @@
           <a:p>
             <a:fld id="{4142EED6-FC16-45B9-B8C4-2BC5DBA88325}" type="datetime1">
               <a:rPr lang="en-US" smtClean="0"/>
-              <a:t>1/29/24</a:t>
+              <a:t>2/2/26</a:t>
             </a:fld>
             <a:endParaRPr lang="en-US"/>
           </a:p>
@@ -3483,7 +3483,7 @@
           <a:p>
             <a:fld id="{DF59512B-4F1D-43D7-8819-2F53FEF69650}" type="datetime1">
               <a:rPr lang="en-US" smtClean="0"/>
-              <a:t>1/29/24</a:t>
+              <a:t>2/2/26</a:t>
             </a:fld>
             <a:endParaRPr lang="en-US"/>
           </a:p>
@@ -3759,7 +3759,7 @@
           <a:p>
             <a:fld id="{08437B94-E2BF-44DC-ADC5-B05FC9934E9D}" type="datetime1">
               <a:rPr lang="en-US" smtClean="0"/>
-              <a:t>1/29/24</a:t>
+              <a:t>2/2/26</a:t>
             </a:fld>
             <a:endParaRPr lang="en-US"/>
           </a:p>
@@ -4685,7 +4685,7 @@
           <a:p>
             <a:fld id="{9B19E99B-5349-415A-8E56-8E989211A366}" type="datetime1">
               <a:rPr lang="en-US" smtClean="0"/>
-              <a:t>1/29/24</a:t>
+              <a:t>2/2/26</a:t>
             </a:fld>
             <a:endParaRPr lang="en-US"/>
           </a:p>
@@ -4824,7 +4824,7 @@
           <a:p>
             <a:fld id="{6700A58B-DD98-43D0-B791-721480A02982}" type="datetime1">
               <a:rPr lang="en-US" smtClean="0"/>
-              <a:t>1/29/24</a:t>
+              <a:t>2/2/26</a:t>
             </a:fld>
             <a:endParaRPr lang="en-US"/>
           </a:p>
@@ -5093,7 +5093,7 @@
           <a:p>
             <a:fld id="{6700A58B-DD98-43D0-B791-721480A02982}" type="datetime1">
               <a:rPr lang="en-US" smtClean="0"/>
-              <a:t>1/29/24</a:t>
+              <a:t>2/2/26</a:t>
             </a:fld>
             <a:endParaRPr lang="en-US"/>
           </a:p>
@@ -6385,7 +6385,7 @@
           <a:p>
             <a:fld id="{6700A58B-DD98-43D0-B791-721480A02982}" type="datetime1">
               <a:rPr lang="en-US" smtClean="0"/>
-              <a:t>1/29/24</a:t>
+              <a:t>2/2/26</a:t>
             </a:fld>
             <a:endParaRPr lang="en-US"/>
           </a:p>
@@ -6814,7 +6814,7 @@
           <a:p>
             <a:fld id="{D753EFC8-4232-4598-94F6-94C0EBAFC469}" type="datetime1">
               <a:rPr lang="en-US" smtClean="0"/>
-              <a:t>1/29/24</a:t>
+              <a:t>2/2/26</a:t>
             </a:fld>
             <a:endParaRPr lang="en-US"/>
           </a:p>
@@ -7334,7 +7334,7 @@
           <a:p>
             <a:fld id="{6700A58B-DD98-43D0-B791-721480A02982}" type="datetime1">
               <a:rPr lang="en-US" smtClean="0"/>
-              <a:t>1/29/24</a:t>
+              <a:t>2/2/26</a:t>
             </a:fld>
             <a:endParaRPr lang="en-US"/>
           </a:p>
@@ -7394,7 +7394,7 @@
         <p:spPr>
           <a:xfrm>
             <a:off x="421856" y="994291"/>
-            <a:ext cx="8505573" cy="3693319"/>
+            <a:ext cx="8505573" cy="2954655"/>
           </a:xfrm>
           <a:prstGeom prst="rect">
             <a:avLst/>
@@ -7445,37 +7445,25 @@
             </a:pPr>
             <a:r>
               <a:rPr lang="en-US" sz="2400" dirty="0"/>
-              <a:t>Read Chapter 3</a:t>
-            </a:r>
-          </a:p>
-          <a:p>
-            <a:endParaRPr lang="en-US" sz="2400" dirty="0"/>
+              <a:t>Read Chapter 3 (if you have the book)</a:t>
+            </a:r>
           </a:p>
           <a:p>
             <a:pPr marL="285750" indent="-285750">
               <a:buFont typeface="Arial" panose="020B0604020202020204" pitchFamily="34" charset="0"/>
               <a:buChar char="•"/>
             </a:pPr>
-            <a:r>
-              <a:rPr lang="en-US" sz="2400" dirty="0"/>
-              <a:t>Ask questions publicly on the class forum or use </a:t>
-            </a:r>
-            <a:r>
-              <a:rPr lang="en-US" sz="2400" dirty="0">
-                <a:hlinkClick r:id="rId2"/>
-              </a:rPr>
-              <a:t>www.llmaid.com</a:t>
-            </a:r>
-            <a:r>
-              <a:rPr lang="en-US" sz="2400" dirty="0"/>
-              <a:t> (beta)</a:t>
-            </a:r>
+            <a:endParaRPr lang="en-US" sz="2400" dirty="0"/>
           </a:p>
           <a:p>
             <a:pPr marL="285750" indent="-285750">
               <a:buFont typeface="Arial" panose="020B0604020202020204" pitchFamily="34" charset="0"/>
               <a:buChar char="•"/>
             </a:pPr>
+            <a:r>
+              <a:rPr lang="en-US" sz="2400"/>
+              <a:t>Try the Challenge!</a:t>
+            </a:r>
             <a:endParaRPr lang="en-US" sz="2400" dirty="0"/>
           </a:p>
           <a:p>
@@ -7576,7 +7564,7 @@
           <a:p>
             <a:fld id="{6700A58B-DD98-43D0-B791-721480A02982}" type="datetime1">
               <a:rPr lang="en-US" smtClean="0"/>
-              <a:t>1/29/24</a:t>
+              <a:t>2/2/26</a:t>
             </a:fld>
             <a:endParaRPr lang="en-US"/>
           </a:p>
@@ -7838,7 +7826,7 @@
           <a:p>
             <a:fld id="{6700A58B-DD98-43D0-B791-721480A02982}" type="datetime1">
               <a:rPr lang="en-US" smtClean="0"/>
-              <a:t>1/29/24</a:t>
+              <a:t>2/2/26</a:t>
             </a:fld>
             <a:endParaRPr lang="en-US"/>
           </a:p>
@@ -8299,7 +8287,7 @@
           <a:p>
             <a:fld id="{6700A58B-DD98-43D0-B791-721480A02982}" type="datetime1">
               <a:rPr lang="en-US" smtClean="0"/>
-              <a:t>1/29/24</a:t>
+              <a:t>2/2/26</a:t>
             </a:fld>
             <a:endParaRPr lang="en-US"/>
           </a:p>
@@ -8778,7 +8766,7 @@
           <a:p>
             <a:fld id="{6700A58B-DD98-43D0-B791-721480A02982}" type="datetime1">
               <a:rPr lang="en-US" smtClean="0"/>
-              <a:t>1/29/24</a:t>
+              <a:t>2/2/26</a:t>
             </a:fld>
             <a:endParaRPr lang="en-US"/>
           </a:p>
@@ -9248,7 +9236,7 @@
           <a:p>
             <a:fld id="{6700A58B-DD98-43D0-B791-721480A02982}" type="datetime1">
               <a:rPr lang="en-US" smtClean="0"/>
-              <a:t>1/29/24</a:t>
+              <a:t>2/2/26</a:t>
             </a:fld>
             <a:endParaRPr lang="en-US"/>
           </a:p>
@@ -9603,7 +9591,7 @@
           <a:p>
             <a:fld id="{6700A58B-DD98-43D0-B791-721480A02982}" type="datetime1">
               <a:rPr lang="en-US" smtClean="0"/>
-              <a:t>1/29/24</a:t>
+              <a:t>2/2/26</a:t>
             </a:fld>
             <a:endParaRPr lang="en-US"/>
           </a:p>
@@ -9841,7 +9829,7 @@
           <a:p>
             <a:fld id="{6700A58B-DD98-43D0-B791-721480A02982}" type="datetime1">
               <a:rPr lang="en-US" smtClean="0"/>
-              <a:t>1/29/24</a:t>
+              <a:t>2/2/26</a:t>
             </a:fld>
             <a:endParaRPr lang="en-US"/>
           </a:p>
@@ -10181,7 +10169,7 @@
           <a:p>
             <a:fld id="{6700A58B-DD98-43D0-B791-721480A02982}" type="datetime1">
               <a:rPr lang="en-US" smtClean="0"/>
-              <a:t>1/29/24</a:t>
+              <a:t>2/2/26</a:t>
             </a:fld>
             <a:endParaRPr lang="en-US"/>
           </a:p>

</xml_diff>